<commit_message>
Working code, all rendering, with data caching
</commit_message>
<xml_diff>
--- a/presentation/Final Presentation.pptx
+++ b/presentation/Final Presentation.pptx
@@ -7,9 +7,13 @@
   <p:sldIdLst>
     <p:sldId id="256" r:id="rId2"/>
     <p:sldId id="257" r:id="rId3"/>
-    <p:sldId id="260" r:id="rId4"/>
-    <p:sldId id="258" r:id="rId5"/>
-    <p:sldId id="259" r:id="rId6"/>
+    <p:sldId id="261" r:id="rId4"/>
+    <p:sldId id="262" r:id="rId5"/>
+    <p:sldId id="258" r:id="rId6"/>
+    <p:sldId id="259" r:id="rId7"/>
+    <p:sldId id="263" r:id="rId8"/>
+    <p:sldId id="264" r:id="rId9"/>
+    <p:sldId id="266" r:id="rId10"/>
   </p:sldIdLst>
   <p:sldSz cx="9144000" cy="6858000" type="screen4x3"/>
   <p:notesSz cx="6858000" cy="9144000"/>
@@ -3200,7 +3204,7 @@
         </p:spPr>
         <p:txBody>
           <a:bodyPr anchor="t">
-            <a:normAutofit/>
+            <a:normAutofit fontScale="92500" lnSpcReduction="10000"/>
           </a:bodyPr>
           <a:lstStyle/>
           <a:p>
@@ -3210,7 +3214,7 @@
             </a:pPr>
             <a:r>
               <a:rPr lang="en-US" b="0" dirty="0" smtClean="0"/>
-              <a:t>Highly connected networks</a:t>
+              <a:t>N(k) vs K</a:t>
             </a:r>
           </a:p>
           <a:p>
@@ -3220,7 +3224,17 @@
             </a:pPr>
             <a:r>
               <a:rPr lang="en-US" b="0" dirty="0" smtClean="0"/>
-              <a:t>No clear trend over time</a:t>
+              <a:t>Weighted on left, unweighted on right</a:t>
+            </a:r>
+          </a:p>
+          <a:p>
+            <a:pPr marL="342900" indent="-342900">
+              <a:buFont typeface="Arial" panose="020B0604020202020204" pitchFamily="34" charset="0"/>
+              <a:buChar char="•"/>
+            </a:pPr>
+            <a:r>
+              <a:rPr lang="en-US" b="0" dirty="0" smtClean="0"/>
+              <a:t>Grouped into 10’s because of small graph size </a:t>
             </a:r>
             <a:endParaRPr lang="en-US" b="0" dirty="0"/>
           </a:p>
@@ -3251,7 +3265,7 @@
         <p:spPr>
           <a:xfrm>
             <a:off x="630238" y="2896593"/>
-            <a:ext cx="3868737" cy="2901552"/>
+            <a:ext cx="3868736" cy="2901552"/>
           </a:xfrm>
         </p:spPr>
       </p:pic>
@@ -3336,12 +3350,83 @@
           <a:bodyPr/>
           <a:lstStyle/>
           <a:p>
-            <a:pPr algn="ctr"/>
             <a:r>
               <a:rPr lang="en-US" dirty="0" smtClean="0"/>
-              <a:t>Does weighted make a difference?</a:t>
+              <a:t>Is it a Power-Law Distribution?</a:t>
             </a:r>
             <a:endParaRPr lang="en-US" dirty="0"/>
+          </a:p>
+        </p:txBody>
+      </p:sp>
+      <p:sp>
+        <p:nvSpPr>
+          <p:cNvPr id="3" name="Text Placeholder 2"/>
+          <p:cNvSpPr>
+            <a:spLocks noGrp="1"/>
+          </p:cNvSpPr>
+          <p:nvPr>
+            <p:ph type="body" idx="1"/>
+          </p:nvPr>
+        </p:nvSpPr>
+        <p:spPr>
+          <a:xfrm>
+            <a:off x="629841" y="1681163"/>
+            <a:ext cx="7886699" cy="1215430"/>
+          </a:xfrm>
+        </p:spPr>
+        <p:txBody>
+          <a:bodyPr anchor="t">
+            <a:normAutofit/>
+          </a:bodyPr>
+          <a:lstStyle/>
+          <a:p>
+            <a:pPr marL="342900" indent="-342900">
+              <a:buFont typeface="Arial" panose="020B0604020202020204" pitchFamily="34" charset="0"/>
+              <a:buChar char="•"/>
+            </a:pPr>
+            <a:r>
+              <a:rPr lang="en-US" sz="2000" b="0" dirty="0" smtClean="0"/>
+              <a:t>Log(N(k)) vs log(K), weighted and unweighted</a:t>
+            </a:r>
+          </a:p>
+          <a:p>
+            <a:pPr marL="342900" indent="-342900">
+              <a:buFont typeface="Arial" panose="020B0604020202020204" pitchFamily="34" charset="0"/>
+              <a:buChar char="•"/>
+            </a:pPr>
+            <a:r>
+              <a:rPr lang="en-US" sz="2000" b="0" dirty="0"/>
+              <a:t>95</a:t>
+            </a:r>
+            <a:r>
+              <a:rPr lang="en-US" sz="2000" b="0" baseline="30000" dirty="0"/>
+              <a:t>th</a:t>
+            </a:r>
+            <a:r>
+              <a:rPr lang="en-US" sz="2000" b="0" dirty="0"/>
+              <a:t> congress had a rules </a:t>
+            </a:r>
+            <a:r>
+              <a:rPr lang="en-US" sz="2000" b="0" dirty="0" smtClean="0"/>
+              <a:t>change – no limits on number of cosponsors</a:t>
+            </a:r>
+          </a:p>
+          <a:p>
+            <a:pPr marL="342900" indent="-342900">
+              <a:buFont typeface="Arial" panose="020B0604020202020204" pitchFamily="34" charset="0"/>
+              <a:buChar char="•"/>
+            </a:pPr>
+            <a:r>
+              <a:rPr lang="en-US" sz="2000" b="0" dirty="0" smtClean="0"/>
+              <a:t>Weighted seems to be somewhat power-law, but “right shifted”</a:t>
+            </a:r>
+          </a:p>
+          <a:p>
+            <a:pPr marL="342900" indent="-342900">
+              <a:buFont typeface="Arial" panose="020B0604020202020204" pitchFamily="34" charset="0"/>
+              <a:buChar char="•"/>
+            </a:pPr>
+            <a:endParaRPr lang="en-US" sz="2000" b="0" dirty="0"/>
           </a:p>
         </p:txBody>
       </p:sp>
@@ -3406,7 +3491,7 @@
     </p:spTree>
     <p:extLst>
       <p:ext uri="{BB962C8B-B14F-4D97-AF65-F5344CB8AC3E}">
-        <p14:creationId xmlns:p14="http://schemas.microsoft.com/office/powerpoint/2010/main" val="4075662382"/>
+        <p14:creationId xmlns:p14="http://schemas.microsoft.com/office/powerpoint/2010/main" val="3247826286"/>
       </p:ext>
     </p:extLst>
   </p:cSld>
@@ -3452,241 +3537,379 @@
         </p:nvSpPr>
         <p:spPr/>
         <p:txBody>
-          <a:bodyPr>
-            <a:normAutofit fontScale="90000"/>
+          <a:bodyPr/>
+          <a:lstStyle/>
+          <a:p>
+            <a:r>
+              <a:rPr lang="en-US" dirty="0" smtClean="0"/>
+              <a:t>How about the Senate?</a:t>
+            </a:r>
+            <a:endParaRPr lang="en-US" dirty="0"/>
+          </a:p>
+        </p:txBody>
+      </p:sp>
+      <p:pic>
+        <p:nvPicPr>
+          <p:cNvPr id="8" name="Content Placeholder 7"/>
+          <p:cNvPicPr>
+            <a:picLocks noGrp="1" noChangeAspect="1"/>
+          </p:cNvPicPr>
+          <p:nvPr>
+            <p:ph sz="half" idx="2"/>
+          </p:nvPr>
+        </p:nvPicPr>
+        <p:blipFill>
+          <a:blip r:embed="rId2" cstate="print">
+            <a:extLst>
+              <a:ext uri="{28A0092B-C50C-407E-A947-70E740481C1C}">
+                <a14:useLocalDpi xmlns:a14="http://schemas.microsoft.com/office/drawing/2010/main" val="0"/>
+              </a:ext>
+            </a:extLst>
+          </a:blip>
+          <a:stretch>
+            <a:fillRect/>
+          </a:stretch>
+        </p:blipFill>
+        <p:spPr>
+          <a:xfrm>
+            <a:off x="629840" y="4300151"/>
+            <a:ext cx="2518833" cy="1889125"/>
+          </a:xfrm>
+        </p:spPr>
+      </p:pic>
+      <p:sp>
+        <p:nvSpPr>
+          <p:cNvPr id="5" name="Text Placeholder 4"/>
+          <p:cNvSpPr>
+            <a:spLocks noGrp="1"/>
+          </p:cNvSpPr>
+          <p:nvPr>
+            <p:ph type="body" sz="quarter" idx="3"/>
+          </p:nvPr>
+        </p:nvSpPr>
+        <p:spPr>
+          <a:xfrm>
+            <a:off x="5774724" y="2410639"/>
+            <a:ext cx="2741817" cy="3778636"/>
+          </a:xfrm>
+        </p:spPr>
+        <p:txBody>
+          <a:bodyPr anchor="t">
+            <a:normAutofit/>
           </a:bodyPr>
           <a:lstStyle/>
           <a:p>
-            <a:pPr algn="ctr"/>
-            <a:r>
-              <a:rPr lang="en-US" dirty="0" smtClean="0"/>
-              <a:t>Can Degree Distribution Predict Seniority?</a:t>
-            </a:r>
-            <a:br>
-              <a:rPr lang="en-US" dirty="0" smtClean="0"/>
-            </a:br>
-            <a:r>
-              <a:rPr lang="en-US" sz="2000" dirty="0" smtClean="0"/>
-              <a:t>(110’th Senate Pictured for more accurate seniority)</a:t>
-            </a:r>
+            <a:pPr marL="342900" indent="-342900">
+              <a:buFont typeface="Arial" panose="020B0604020202020204" pitchFamily="34" charset="0"/>
+              <a:buChar char="•"/>
+            </a:pPr>
+            <a:r>
+              <a:rPr lang="en-US" sz="2000" b="0" dirty="0" smtClean="0"/>
+              <a:t>The community size is significantly smaller</a:t>
+            </a:r>
+          </a:p>
+          <a:p>
+            <a:pPr marL="342900" indent="-342900">
+              <a:buFont typeface="Arial" panose="020B0604020202020204" pitchFamily="34" charset="0"/>
+              <a:buChar char="•"/>
+            </a:pPr>
+            <a:r>
+              <a:rPr lang="en-US" sz="2000" b="0" dirty="0" smtClean="0"/>
+              <a:t>No obvious power-law distribution, possibly due to the group size</a:t>
+            </a:r>
+          </a:p>
+          <a:p>
+            <a:pPr marL="342900" indent="-342900">
+              <a:buFont typeface="Arial" panose="020B0604020202020204" pitchFamily="34" charset="0"/>
+              <a:buChar char="•"/>
+            </a:pPr>
+            <a:endParaRPr lang="en-US" sz="2000" b="0" dirty="0"/>
+          </a:p>
+        </p:txBody>
+      </p:sp>
+      <p:pic>
+        <p:nvPicPr>
+          <p:cNvPr id="10" name="Content Placeholder 9"/>
+          <p:cNvPicPr>
+            <a:picLocks noGrp="1" noChangeAspect="1"/>
+          </p:cNvPicPr>
+          <p:nvPr>
+            <p:ph sz="quarter" idx="4"/>
+          </p:nvPr>
+        </p:nvPicPr>
+        <p:blipFill>
+          <a:blip r:embed="rId3" cstate="print">
+            <a:extLst>
+              <a:ext uri="{28A0092B-C50C-407E-A947-70E740481C1C}">
+                <a14:useLocalDpi xmlns:a14="http://schemas.microsoft.com/office/drawing/2010/main" val="0"/>
+              </a:ext>
+            </a:extLst>
+          </a:blip>
+          <a:stretch>
+            <a:fillRect/>
+          </a:stretch>
+        </p:blipFill>
+        <p:spPr>
+          <a:xfrm>
+            <a:off x="3148673" y="4305611"/>
+            <a:ext cx="2511553" cy="1883665"/>
+          </a:xfrm>
+        </p:spPr>
+      </p:pic>
+      <p:sp>
+        <p:nvSpPr>
+          <p:cNvPr id="7" name="Content Placeholder 3"/>
+          <p:cNvSpPr txBox="1">
+            <a:spLocks/>
+          </p:cNvSpPr>
+          <p:nvPr/>
+        </p:nvSpPr>
+        <p:spPr>
+          <a:xfrm>
+            <a:off x="629841" y="2410639"/>
+            <a:ext cx="3868340" cy="1889512"/>
+          </a:xfrm>
+          <a:prstGeom prst="rect">
+            <a:avLst/>
+          </a:prstGeom>
+        </p:spPr>
+        <p:txBody>
+          <a:bodyPr vert="horz" lIns="91440" tIns="45720" rIns="91440" bIns="45720" rtlCol="0">
+            <a:normAutofit/>
+          </a:bodyPr>
+          <a:lstStyle>
+            <a:lvl1pPr marL="228600" indent="-228600" algn="l" defTabSz="914400" rtl="0" eaLnBrk="1" latinLnBrk="0" hangingPunct="1">
+              <a:lnSpc>
+                <a:spcPct val="90000"/>
+              </a:lnSpc>
+              <a:spcBef>
+                <a:spcPts val="1000"/>
+              </a:spcBef>
+              <a:buFont typeface="Arial" panose="020B0604020202020204" pitchFamily="34" charset="0"/>
+              <a:buChar char="•"/>
+              <a:defRPr sz="2800" kern="1200">
+                <a:solidFill>
+                  <a:schemeClr val="tx1"/>
+                </a:solidFill>
+                <a:latin typeface="+mn-lt"/>
+                <a:ea typeface="+mn-ea"/>
+                <a:cs typeface="+mn-cs"/>
+              </a:defRPr>
+            </a:lvl1pPr>
+            <a:lvl2pPr marL="685800" indent="-228600" algn="l" defTabSz="914400" rtl="0" eaLnBrk="1" latinLnBrk="0" hangingPunct="1">
+              <a:lnSpc>
+                <a:spcPct val="90000"/>
+              </a:lnSpc>
+              <a:spcBef>
+                <a:spcPts val="500"/>
+              </a:spcBef>
+              <a:buFont typeface="Arial" panose="020B0604020202020204" pitchFamily="34" charset="0"/>
+              <a:buChar char="•"/>
+              <a:defRPr sz="2400" kern="1200">
+                <a:solidFill>
+                  <a:schemeClr val="tx1"/>
+                </a:solidFill>
+                <a:latin typeface="+mn-lt"/>
+                <a:ea typeface="+mn-ea"/>
+                <a:cs typeface="+mn-cs"/>
+              </a:defRPr>
+            </a:lvl2pPr>
+            <a:lvl3pPr marL="1143000" indent="-228600" algn="l" defTabSz="914400" rtl="0" eaLnBrk="1" latinLnBrk="0" hangingPunct="1">
+              <a:lnSpc>
+                <a:spcPct val="90000"/>
+              </a:lnSpc>
+              <a:spcBef>
+                <a:spcPts val="500"/>
+              </a:spcBef>
+              <a:buFont typeface="Arial" panose="020B0604020202020204" pitchFamily="34" charset="0"/>
+              <a:buChar char="•"/>
+              <a:defRPr sz="2000" kern="1200">
+                <a:solidFill>
+                  <a:schemeClr val="tx1"/>
+                </a:solidFill>
+                <a:latin typeface="+mn-lt"/>
+                <a:ea typeface="+mn-ea"/>
+                <a:cs typeface="+mn-cs"/>
+              </a:defRPr>
+            </a:lvl3pPr>
+            <a:lvl4pPr marL="1600200" indent="-228600" algn="l" defTabSz="914400" rtl="0" eaLnBrk="1" latinLnBrk="0" hangingPunct="1">
+              <a:lnSpc>
+                <a:spcPct val="90000"/>
+              </a:lnSpc>
+              <a:spcBef>
+                <a:spcPts val="500"/>
+              </a:spcBef>
+              <a:buFont typeface="Arial" panose="020B0604020202020204" pitchFamily="34" charset="0"/>
+              <a:buChar char="•"/>
+              <a:defRPr sz="1800" kern="1200">
+                <a:solidFill>
+                  <a:schemeClr val="tx1"/>
+                </a:solidFill>
+                <a:latin typeface="+mn-lt"/>
+                <a:ea typeface="+mn-ea"/>
+                <a:cs typeface="+mn-cs"/>
+              </a:defRPr>
+            </a:lvl4pPr>
+            <a:lvl5pPr marL="2057400" indent="-228600" algn="l" defTabSz="914400" rtl="0" eaLnBrk="1" latinLnBrk="0" hangingPunct="1">
+              <a:lnSpc>
+                <a:spcPct val="90000"/>
+              </a:lnSpc>
+              <a:spcBef>
+                <a:spcPts val="500"/>
+              </a:spcBef>
+              <a:buFont typeface="Arial" panose="020B0604020202020204" pitchFamily="34" charset="0"/>
+              <a:buChar char="•"/>
+              <a:defRPr sz="1800" kern="1200">
+                <a:solidFill>
+                  <a:schemeClr val="tx1"/>
+                </a:solidFill>
+                <a:latin typeface="+mn-lt"/>
+                <a:ea typeface="+mn-ea"/>
+                <a:cs typeface="+mn-cs"/>
+              </a:defRPr>
+            </a:lvl5pPr>
+            <a:lvl6pPr marL="2514600" indent="-228600" algn="l" defTabSz="914400" rtl="0" eaLnBrk="1" latinLnBrk="0" hangingPunct="1">
+              <a:lnSpc>
+                <a:spcPct val="90000"/>
+              </a:lnSpc>
+              <a:spcBef>
+                <a:spcPts val="500"/>
+              </a:spcBef>
+              <a:buFont typeface="Arial" panose="020B0604020202020204" pitchFamily="34" charset="0"/>
+              <a:buChar char="•"/>
+              <a:defRPr sz="1800" kern="1200">
+                <a:solidFill>
+                  <a:schemeClr val="tx1"/>
+                </a:solidFill>
+                <a:latin typeface="+mn-lt"/>
+                <a:ea typeface="+mn-ea"/>
+                <a:cs typeface="+mn-cs"/>
+              </a:defRPr>
+            </a:lvl6pPr>
+            <a:lvl7pPr marL="2971800" indent="-228600" algn="l" defTabSz="914400" rtl="0" eaLnBrk="1" latinLnBrk="0" hangingPunct="1">
+              <a:lnSpc>
+                <a:spcPct val="90000"/>
+              </a:lnSpc>
+              <a:spcBef>
+                <a:spcPts val="500"/>
+              </a:spcBef>
+              <a:buFont typeface="Arial" panose="020B0604020202020204" pitchFamily="34" charset="0"/>
+              <a:buChar char="•"/>
+              <a:defRPr sz="1800" kern="1200">
+                <a:solidFill>
+                  <a:schemeClr val="tx1"/>
+                </a:solidFill>
+                <a:latin typeface="+mn-lt"/>
+                <a:ea typeface="+mn-ea"/>
+                <a:cs typeface="+mn-cs"/>
+              </a:defRPr>
+            </a:lvl7pPr>
+            <a:lvl8pPr marL="3429000" indent="-228600" algn="l" defTabSz="914400" rtl="0" eaLnBrk="1" latinLnBrk="0" hangingPunct="1">
+              <a:lnSpc>
+                <a:spcPct val="90000"/>
+              </a:lnSpc>
+              <a:spcBef>
+                <a:spcPts val="500"/>
+              </a:spcBef>
+              <a:buFont typeface="Arial" panose="020B0604020202020204" pitchFamily="34" charset="0"/>
+              <a:buChar char="•"/>
+              <a:defRPr sz="1800" kern="1200">
+                <a:solidFill>
+                  <a:schemeClr val="tx1"/>
+                </a:solidFill>
+                <a:latin typeface="+mn-lt"/>
+                <a:ea typeface="+mn-ea"/>
+                <a:cs typeface="+mn-cs"/>
+              </a:defRPr>
+            </a:lvl8pPr>
+            <a:lvl9pPr marL="3886200" indent="-228600" algn="l" defTabSz="914400" rtl="0" eaLnBrk="1" latinLnBrk="0" hangingPunct="1">
+              <a:lnSpc>
+                <a:spcPct val="90000"/>
+              </a:lnSpc>
+              <a:spcBef>
+                <a:spcPts val="500"/>
+              </a:spcBef>
+              <a:buFont typeface="Arial" panose="020B0604020202020204" pitchFamily="34" charset="0"/>
+              <a:buChar char="•"/>
+              <a:defRPr sz="1800" kern="1200">
+                <a:solidFill>
+                  <a:schemeClr val="tx1"/>
+                </a:solidFill>
+                <a:latin typeface="+mn-lt"/>
+                <a:ea typeface="+mn-ea"/>
+                <a:cs typeface="+mn-cs"/>
+              </a:defRPr>
+            </a:lvl9pPr>
+          </a:lstStyle>
+          <a:p>
             <a:endParaRPr lang="en-US" dirty="0"/>
           </a:p>
         </p:txBody>
       </p:sp>
-      <p:grpSp>
-        <p:nvGrpSpPr>
-          <p:cNvPr id="13" name="Group 12"/>
-          <p:cNvGrpSpPr/>
+      <p:pic>
+        <p:nvPicPr>
+          <p:cNvPr id="9" name="Content Placeholder 7"/>
+          <p:cNvPicPr>
+            <a:picLocks noChangeAspect="1"/>
+          </p:cNvPicPr>
           <p:nvPr/>
-        </p:nvGrpSpPr>
-        <p:grpSpPr>
+        </p:nvPicPr>
+        <p:blipFill>
+          <a:blip r:embed="rId4" cstate="print">
+            <a:extLst>
+              <a:ext uri="{28A0092B-C50C-407E-A947-70E740481C1C}">
+                <a14:useLocalDpi xmlns:a14="http://schemas.microsoft.com/office/drawing/2010/main" val="0"/>
+              </a:ext>
+            </a:extLst>
+          </a:blip>
+          <a:stretch>
+            <a:fillRect/>
+          </a:stretch>
+        </p:blipFill>
+        <p:spPr>
           <a:xfrm>
-            <a:off x="0" y="4572000"/>
-            <a:ext cx="9144000" cy="2286000"/>
-            <a:chOff x="-1619428" y="4079105"/>
-            <a:chExt cx="12109644" cy="3027412"/>
+            <a:off x="629840" y="2410639"/>
+            <a:ext cx="2518833" cy="1889124"/>
           </a:xfrm>
-        </p:grpSpPr>
-        <p:pic>
-          <p:nvPicPr>
-            <p:cNvPr id="7" name="Picture 6"/>
-            <p:cNvPicPr>
-              <a:picLocks noChangeAspect="1"/>
-            </p:cNvPicPr>
-            <p:nvPr/>
-          </p:nvPicPr>
-          <p:blipFill>
-            <a:blip r:embed="rId2" cstate="print">
-              <a:extLst>
-                <a:ext uri="{28A0092B-C50C-407E-A947-70E740481C1C}">
-                  <a14:useLocalDpi xmlns:a14="http://schemas.microsoft.com/office/drawing/2010/main" val="0"/>
-                </a:ext>
-              </a:extLst>
-            </a:blip>
-            <a:stretch>
-              <a:fillRect/>
-            </a:stretch>
-          </p:blipFill>
-          <p:spPr>
-            <a:xfrm>
-              <a:off x="6453668" y="4079105"/>
-              <a:ext cx="4036548" cy="3027411"/>
-            </a:xfrm>
-            <a:prstGeom prst="rect">
-              <a:avLst/>
-            </a:prstGeom>
-          </p:spPr>
-        </p:pic>
-        <p:pic>
-          <p:nvPicPr>
-            <p:cNvPr id="8" name="Picture 7"/>
-            <p:cNvPicPr>
-              <a:picLocks noChangeAspect="1"/>
-            </p:cNvPicPr>
-            <p:nvPr/>
-          </p:nvPicPr>
-          <p:blipFill>
-            <a:blip r:embed="rId3" cstate="print">
-              <a:extLst>
-                <a:ext uri="{28A0092B-C50C-407E-A947-70E740481C1C}">
-                  <a14:useLocalDpi xmlns:a14="http://schemas.microsoft.com/office/drawing/2010/main" val="0"/>
-                </a:ext>
-              </a:extLst>
-            </a:blip>
-            <a:stretch>
-              <a:fillRect/>
-            </a:stretch>
-          </p:blipFill>
-          <p:spPr>
-            <a:xfrm>
-              <a:off x="-1619428" y="4079105"/>
-              <a:ext cx="4036548" cy="3027411"/>
-            </a:xfrm>
-            <a:prstGeom prst="rect">
-              <a:avLst/>
-            </a:prstGeom>
-          </p:spPr>
-        </p:pic>
-        <p:pic>
-          <p:nvPicPr>
-            <p:cNvPr id="9" name="Picture 8"/>
-            <p:cNvPicPr>
-              <a:picLocks noChangeAspect="1"/>
-            </p:cNvPicPr>
-            <p:nvPr/>
-          </p:nvPicPr>
-          <p:blipFill>
-            <a:blip r:embed="rId4" cstate="print">
-              <a:extLst>
-                <a:ext uri="{28A0092B-C50C-407E-A947-70E740481C1C}">
-                  <a14:useLocalDpi xmlns:a14="http://schemas.microsoft.com/office/drawing/2010/main" val="0"/>
-                </a:ext>
-              </a:extLst>
-            </a:blip>
-            <a:stretch>
-              <a:fillRect/>
-            </a:stretch>
-          </p:blipFill>
-          <p:spPr>
-            <a:xfrm>
-              <a:off x="2417120" y="4079106"/>
-              <a:ext cx="4036548" cy="3027411"/>
-            </a:xfrm>
-            <a:prstGeom prst="rect">
-              <a:avLst/>
-            </a:prstGeom>
-          </p:spPr>
-        </p:pic>
-      </p:grpSp>
-      <p:grpSp>
-        <p:nvGrpSpPr>
-          <p:cNvPr id="14" name="Group 13"/>
-          <p:cNvGrpSpPr/>
+          <a:prstGeom prst="rect">
+            <a:avLst/>
+          </a:prstGeom>
+        </p:spPr>
+      </p:pic>
+      <p:pic>
+        <p:nvPicPr>
+          <p:cNvPr id="11" name="Content Placeholder 9"/>
+          <p:cNvPicPr>
+            <a:picLocks noChangeAspect="1"/>
+          </p:cNvPicPr>
           <p:nvPr/>
-        </p:nvGrpSpPr>
-        <p:grpSpPr>
+        </p:nvPicPr>
+        <p:blipFill>
+          <a:blip r:embed="rId5" cstate="print">
+            <a:extLst>
+              <a:ext uri="{28A0092B-C50C-407E-A947-70E740481C1C}">
+                <a14:useLocalDpi xmlns:a14="http://schemas.microsoft.com/office/drawing/2010/main" val="0"/>
+              </a:ext>
+            </a:extLst>
+          </a:blip>
+          <a:stretch>
+            <a:fillRect/>
+          </a:stretch>
+        </p:blipFill>
+        <p:spPr>
           <a:xfrm>
-            <a:off x="0" y="2286000"/>
-            <a:ext cx="9144000" cy="2286000"/>
-            <a:chOff x="-1561763" y="754035"/>
-            <a:chExt cx="12109644" cy="3027412"/>
+            <a:off x="3148673" y="2416099"/>
+            <a:ext cx="2511553" cy="1883664"/>
           </a:xfrm>
-        </p:grpSpPr>
-        <p:pic>
-          <p:nvPicPr>
-            <p:cNvPr id="10" name="Picture 9"/>
-            <p:cNvPicPr>
-              <a:picLocks noChangeAspect="1"/>
-            </p:cNvPicPr>
-            <p:nvPr/>
-          </p:nvPicPr>
-          <p:blipFill>
-            <a:blip r:embed="rId5" cstate="print">
-              <a:extLst>
-                <a:ext uri="{28A0092B-C50C-407E-A947-70E740481C1C}">
-                  <a14:useLocalDpi xmlns:a14="http://schemas.microsoft.com/office/drawing/2010/main" val="0"/>
-                </a:ext>
-              </a:extLst>
-            </a:blip>
-            <a:stretch>
-              <a:fillRect/>
-            </a:stretch>
-          </p:blipFill>
-          <p:spPr>
-            <a:xfrm>
-              <a:off x="6511333" y="754035"/>
-              <a:ext cx="4036548" cy="3027411"/>
-            </a:xfrm>
-            <a:prstGeom prst="rect">
-              <a:avLst/>
-            </a:prstGeom>
-          </p:spPr>
-        </p:pic>
-        <p:pic>
-          <p:nvPicPr>
-            <p:cNvPr id="11" name="Picture 10"/>
-            <p:cNvPicPr>
-              <a:picLocks noChangeAspect="1"/>
-            </p:cNvPicPr>
-            <p:nvPr/>
-          </p:nvPicPr>
-          <p:blipFill>
-            <a:blip r:embed="rId6" cstate="print">
-              <a:extLst>
-                <a:ext uri="{28A0092B-C50C-407E-A947-70E740481C1C}">
-                  <a14:useLocalDpi xmlns:a14="http://schemas.microsoft.com/office/drawing/2010/main" val="0"/>
-                </a:ext>
-              </a:extLst>
-            </a:blip>
-            <a:stretch>
-              <a:fillRect/>
-            </a:stretch>
-          </p:blipFill>
-          <p:spPr>
-            <a:xfrm>
-              <a:off x="-1561763" y="754036"/>
-              <a:ext cx="4036548" cy="3027411"/>
-            </a:xfrm>
-            <a:prstGeom prst="rect">
-              <a:avLst/>
-            </a:prstGeom>
-          </p:spPr>
-        </p:pic>
-        <p:pic>
-          <p:nvPicPr>
-            <p:cNvPr id="12" name="Picture 11"/>
-            <p:cNvPicPr>
-              <a:picLocks noChangeAspect="1"/>
-            </p:cNvPicPr>
-            <p:nvPr/>
-          </p:nvPicPr>
-          <p:blipFill>
-            <a:blip r:embed="rId7" cstate="print">
-              <a:extLst>
-                <a:ext uri="{28A0092B-C50C-407E-A947-70E740481C1C}">
-                  <a14:useLocalDpi xmlns:a14="http://schemas.microsoft.com/office/drawing/2010/main" val="0"/>
-                </a:ext>
-              </a:extLst>
-            </a:blip>
-            <a:stretch>
-              <a:fillRect/>
-            </a:stretch>
-          </p:blipFill>
-          <p:spPr>
-            <a:xfrm>
-              <a:off x="2474785" y="754036"/>
-              <a:ext cx="4036548" cy="3027411"/>
-            </a:xfrm>
-            <a:prstGeom prst="rect">
-              <a:avLst/>
-            </a:prstGeom>
-          </p:spPr>
-        </p:pic>
-      </p:grpSp>
+          <a:prstGeom prst="rect">
+            <a:avLst/>
+          </a:prstGeom>
+        </p:spPr>
+      </p:pic>
     </p:spTree>
     <p:extLst>
       <p:ext uri="{BB962C8B-B14F-4D97-AF65-F5344CB8AC3E}">
-        <p14:creationId xmlns:p14="http://schemas.microsoft.com/office/powerpoint/2010/main" val="1274707076"/>
+        <p14:creationId xmlns:p14="http://schemas.microsoft.com/office/powerpoint/2010/main" val="1666031859"/>
       </p:ext>
     </p:extLst>
   </p:cSld>
@@ -3732,6 +3955,256 @@
         </p:nvSpPr>
         <p:spPr/>
         <p:txBody>
+          <a:bodyPr>
+            <a:normAutofit fontScale="90000"/>
+          </a:bodyPr>
+          <a:lstStyle/>
+          <a:p>
+            <a:pPr algn="ctr"/>
+            <a:r>
+              <a:rPr lang="en-US" dirty="0" smtClean="0"/>
+              <a:t>Can Degree Distribution Predict Seniority?</a:t>
+            </a:r>
+            <a:br>
+              <a:rPr lang="en-US" dirty="0" smtClean="0"/>
+            </a:br>
+            <a:r>
+              <a:rPr lang="en-US" sz="2000" dirty="0" smtClean="0"/>
+              <a:t>(110’th Senate Pictured for more accurate seniority)</a:t>
+            </a:r>
+            <a:endParaRPr lang="en-US" dirty="0"/>
+          </a:p>
+        </p:txBody>
+      </p:sp>
+      <p:pic>
+        <p:nvPicPr>
+          <p:cNvPr id="7" name="Picture 6"/>
+          <p:cNvPicPr>
+            <a:picLocks noChangeAspect="1"/>
+          </p:cNvPicPr>
+          <p:nvPr/>
+        </p:nvPicPr>
+        <p:blipFill>
+          <a:blip r:embed="rId2" cstate="print">
+            <a:extLst>
+              <a:ext uri="{28A0092B-C50C-407E-A947-70E740481C1C}">
+                <a14:useLocalDpi xmlns:a14="http://schemas.microsoft.com/office/drawing/2010/main" val="0"/>
+              </a:ext>
+            </a:extLst>
+          </a:blip>
+          <a:stretch>
+            <a:fillRect/>
+          </a:stretch>
+        </p:blipFill>
+        <p:spPr>
+          <a:xfrm>
+            <a:off x="6096001" y="4572000"/>
+            <a:ext cx="3047998" cy="2285999"/>
+          </a:xfrm>
+          <a:prstGeom prst="rect">
+            <a:avLst/>
+          </a:prstGeom>
+        </p:spPr>
+      </p:pic>
+      <p:pic>
+        <p:nvPicPr>
+          <p:cNvPr id="8" name="Picture 7"/>
+          <p:cNvPicPr>
+            <a:picLocks noChangeAspect="1"/>
+          </p:cNvPicPr>
+          <p:nvPr/>
+        </p:nvPicPr>
+        <p:blipFill>
+          <a:blip r:embed="rId3" cstate="print">
+            <a:extLst>
+              <a:ext uri="{28A0092B-C50C-407E-A947-70E740481C1C}">
+                <a14:useLocalDpi xmlns:a14="http://schemas.microsoft.com/office/drawing/2010/main" val="0"/>
+              </a:ext>
+            </a:extLst>
+          </a:blip>
+          <a:stretch>
+            <a:fillRect/>
+          </a:stretch>
+        </p:blipFill>
+        <p:spPr>
+          <a:xfrm>
+            <a:off x="1" y="4572000"/>
+            <a:ext cx="3047998" cy="2285999"/>
+          </a:xfrm>
+          <a:prstGeom prst="rect">
+            <a:avLst/>
+          </a:prstGeom>
+        </p:spPr>
+      </p:pic>
+      <p:pic>
+        <p:nvPicPr>
+          <p:cNvPr id="9" name="Picture 8"/>
+          <p:cNvPicPr>
+            <a:picLocks noChangeAspect="1"/>
+          </p:cNvPicPr>
+          <p:nvPr/>
+        </p:nvPicPr>
+        <p:blipFill>
+          <a:blip r:embed="rId4" cstate="print">
+            <a:extLst>
+              <a:ext uri="{28A0092B-C50C-407E-A947-70E740481C1C}">
+                <a14:useLocalDpi xmlns:a14="http://schemas.microsoft.com/office/drawing/2010/main" val="0"/>
+              </a:ext>
+            </a:extLst>
+          </a:blip>
+          <a:stretch>
+            <a:fillRect/>
+          </a:stretch>
+        </p:blipFill>
+        <p:spPr>
+          <a:xfrm>
+            <a:off x="3048001" y="4572001"/>
+            <a:ext cx="3047998" cy="2285999"/>
+          </a:xfrm>
+          <a:prstGeom prst="rect">
+            <a:avLst/>
+          </a:prstGeom>
+        </p:spPr>
+      </p:pic>
+      <p:pic>
+        <p:nvPicPr>
+          <p:cNvPr id="10" name="Picture 9"/>
+          <p:cNvPicPr>
+            <a:picLocks noChangeAspect="1"/>
+          </p:cNvPicPr>
+          <p:nvPr/>
+        </p:nvPicPr>
+        <p:blipFill>
+          <a:blip r:embed="rId5" cstate="print">
+            <a:extLst>
+              <a:ext uri="{28A0092B-C50C-407E-A947-70E740481C1C}">
+                <a14:useLocalDpi xmlns:a14="http://schemas.microsoft.com/office/drawing/2010/main" val="0"/>
+              </a:ext>
+            </a:extLst>
+          </a:blip>
+          <a:stretch>
+            <a:fillRect/>
+          </a:stretch>
+        </p:blipFill>
+        <p:spPr>
+          <a:xfrm>
+            <a:off x="6096001" y="2286000"/>
+            <a:ext cx="3047998" cy="2285999"/>
+          </a:xfrm>
+          <a:prstGeom prst="rect">
+            <a:avLst/>
+          </a:prstGeom>
+        </p:spPr>
+      </p:pic>
+      <p:pic>
+        <p:nvPicPr>
+          <p:cNvPr id="11" name="Picture 10"/>
+          <p:cNvPicPr>
+            <a:picLocks noChangeAspect="1"/>
+          </p:cNvPicPr>
+          <p:nvPr/>
+        </p:nvPicPr>
+        <p:blipFill>
+          <a:blip r:embed="rId6" cstate="print">
+            <a:extLst>
+              <a:ext uri="{28A0092B-C50C-407E-A947-70E740481C1C}">
+                <a14:useLocalDpi xmlns:a14="http://schemas.microsoft.com/office/drawing/2010/main" val="0"/>
+              </a:ext>
+            </a:extLst>
+          </a:blip>
+          <a:stretch>
+            <a:fillRect/>
+          </a:stretch>
+        </p:blipFill>
+        <p:spPr>
+          <a:xfrm>
+            <a:off x="1" y="2286001"/>
+            <a:ext cx="3047998" cy="2285999"/>
+          </a:xfrm>
+          <a:prstGeom prst="rect">
+            <a:avLst/>
+          </a:prstGeom>
+        </p:spPr>
+      </p:pic>
+      <p:pic>
+        <p:nvPicPr>
+          <p:cNvPr id="12" name="Picture 11"/>
+          <p:cNvPicPr>
+            <a:picLocks noChangeAspect="1"/>
+          </p:cNvPicPr>
+          <p:nvPr/>
+        </p:nvPicPr>
+        <p:blipFill>
+          <a:blip r:embed="rId5" cstate="print">
+            <a:extLst>
+              <a:ext uri="{28A0092B-C50C-407E-A947-70E740481C1C}">
+                <a14:useLocalDpi xmlns:a14="http://schemas.microsoft.com/office/drawing/2010/main" val="0"/>
+              </a:ext>
+            </a:extLst>
+          </a:blip>
+          <a:stretch>
+            <a:fillRect/>
+          </a:stretch>
+        </p:blipFill>
+        <p:spPr>
+          <a:xfrm>
+            <a:off x="3048001" y="2286001"/>
+            <a:ext cx="3047998" cy="2285999"/>
+          </a:xfrm>
+          <a:prstGeom prst="rect">
+            <a:avLst/>
+          </a:prstGeom>
+        </p:spPr>
+      </p:pic>
+    </p:spTree>
+    <p:extLst>
+      <p:ext uri="{BB962C8B-B14F-4D97-AF65-F5344CB8AC3E}">
+        <p14:creationId xmlns:p14="http://schemas.microsoft.com/office/powerpoint/2010/main" val="1274707076"/>
+      </p:ext>
+    </p:extLst>
+  </p:cSld>
+  <p:clrMapOvr>
+    <a:masterClrMapping/>
+  </p:clrMapOvr>
+  <p:timing>
+    <p:tnLst>
+      <p:par>
+        <p:cTn id="1" dur="indefinite" restart="never" nodeType="tmRoot"/>
+      </p:par>
+    </p:tnLst>
+  </p:timing>
+</p:sld>
+</file>
+
+<file path=ppt/slides/slide6.xml><?xml version="1.0" encoding="utf-8"?>
+<p:sld xmlns:a="http://schemas.openxmlformats.org/drawingml/2006/main" xmlns:r="http://schemas.openxmlformats.org/officeDocument/2006/relationships" xmlns:p="http://schemas.openxmlformats.org/presentationml/2006/main">
+  <p:cSld>
+    <p:spTree>
+      <p:nvGrpSpPr>
+        <p:cNvPr id="1" name=""/>
+        <p:cNvGrpSpPr/>
+        <p:nvPr/>
+      </p:nvGrpSpPr>
+      <p:grpSpPr>
+        <a:xfrm>
+          <a:off x="0" y="0"/>
+          <a:ext cx="0" cy="0"/>
+          <a:chOff x="0" y="0"/>
+          <a:chExt cx="0" cy="0"/>
+        </a:xfrm>
+      </p:grpSpPr>
+      <p:sp>
+        <p:nvSpPr>
+          <p:cNvPr id="2" name="Title 1"/>
+          <p:cNvSpPr>
+            <a:spLocks noGrp="1"/>
+          </p:cNvSpPr>
+          <p:nvPr>
+            <p:ph type="title"/>
+          </p:nvPr>
+        </p:nvSpPr>
+        <p:spPr/>
+        <p:txBody>
           <a:bodyPr/>
           <a:lstStyle/>
           <a:p>
@@ -3745,222 +4218,248 @@
             </a:r>
             <a:r>
               <a:rPr lang="en-US" dirty="0" smtClean="0"/>
-              <a:t> House</a:t>
+              <a:t> </a:t>
+            </a:r>
+            <a:r>
+              <a:rPr lang="en-US" dirty="0" smtClean="0"/>
+              <a:t>House</a:t>
             </a:r>
             <a:endParaRPr lang="en-US" dirty="0"/>
           </a:p>
         </p:txBody>
       </p:sp>
-      <p:grpSp>
-        <p:nvGrpSpPr>
-          <p:cNvPr id="14" name="Group 13"/>
-          <p:cNvGrpSpPr/>
+      <p:pic>
+        <p:nvPicPr>
+          <p:cNvPr id="7" name="Picture 6"/>
+          <p:cNvPicPr>
+            <a:picLocks noChangeAspect="1"/>
+          </p:cNvPicPr>
           <p:nvPr/>
-        </p:nvGrpSpPr>
-        <p:grpSpPr>
+        </p:nvPicPr>
+        <p:blipFill>
+          <a:blip r:embed="rId2" cstate="print">
+            <a:extLst>
+              <a:ext uri="{28A0092B-C50C-407E-A947-70E740481C1C}">
+                <a14:useLocalDpi xmlns:a14="http://schemas.microsoft.com/office/drawing/2010/main" val="0"/>
+              </a:ext>
+            </a:extLst>
+          </a:blip>
+          <a:stretch>
+            <a:fillRect/>
+          </a:stretch>
+        </p:blipFill>
+        <p:spPr>
           <a:xfrm>
-            <a:off x="0" y="2285996"/>
-            <a:ext cx="9144000" cy="2286001"/>
-            <a:chOff x="-1848023" y="4133893"/>
-            <a:chExt cx="11960316" cy="2990080"/>
+            <a:off x="6096000" y="4571999"/>
+            <a:ext cx="3048000" cy="2285999"/>
           </a:xfrm>
-        </p:grpSpPr>
-        <p:pic>
-          <p:nvPicPr>
-            <p:cNvPr id="7" name="Picture 6"/>
-            <p:cNvPicPr>
-              <a:picLocks noChangeAspect="1"/>
-            </p:cNvPicPr>
-            <p:nvPr/>
-          </p:nvPicPr>
-          <p:blipFill>
-            <a:blip r:embed="rId2" cstate="print">
-              <a:extLst>
-                <a:ext uri="{28A0092B-C50C-407E-A947-70E740481C1C}">
-                  <a14:useLocalDpi xmlns:a14="http://schemas.microsoft.com/office/drawing/2010/main" val="0"/>
-                </a:ext>
-              </a:extLst>
-            </a:blip>
-            <a:stretch>
-              <a:fillRect/>
-            </a:stretch>
-          </p:blipFill>
-          <p:spPr>
-            <a:xfrm>
-              <a:off x="6125521" y="4133893"/>
-              <a:ext cx="3986772" cy="2990079"/>
-            </a:xfrm>
-            <a:prstGeom prst="rect">
-              <a:avLst/>
-            </a:prstGeom>
-          </p:spPr>
-        </p:pic>
-        <p:pic>
-          <p:nvPicPr>
-            <p:cNvPr id="8" name="Picture 7"/>
-            <p:cNvPicPr>
-              <a:picLocks noChangeAspect="1"/>
-            </p:cNvPicPr>
-            <p:nvPr/>
-          </p:nvPicPr>
-          <p:blipFill>
-            <a:blip r:embed="rId3" cstate="print">
-              <a:extLst>
-                <a:ext uri="{28A0092B-C50C-407E-A947-70E740481C1C}">
-                  <a14:useLocalDpi xmlns:a14="http://schemas.microsoft.com/office/drawing/2010/main" val="0"/>
-                </a:ext>
-              </a:extLst>
-            </a:blip>
-            <a:stretch>
-              <a:fillRect/>
-            </a:stretch>
-          </p:blipFill>
-          <p:spPr>
-            <a:xfrm>
-              <a:off x="-1848023" y="4133894"/>
-              <a:ext cx="3986772" cy="2990079"/>
-            </a:xfrm>
-            <a:prstGeom prst="rect">
-              <a:avLst/>
-            </a:prstGeom>
-          </p:spPr>
-        </p:pic>
-        <p:pic>
-          <p:nvPicPr>
-            <p:cNvPr id="9" name="Picture 8"/>
-            <p:cNvPicPr>
-              <a:picLocks noChangeAspect="1"/>
-            </p:cNvPicPr>
-            <p:nvPr/>
-          </p:nvPicPr>
-          <p:blipFill>
-            <a:blip r:embed="rId4" cstate="print">
-              <a:extLst>
-                <a:ext uri="{28A0092B-C50C-407E-A947-70E740481C1C}">
-                  <a14:useLocalDpi xmlns:a14="http://schemas.microsoft.com/office/drawing/2010/main" val="0"/>
-                </a:ext>
-              </a:extLst>
-            </a:blip>
-            <a:stretch>
-              <a:fillRect/>
-            </a:stretch>
-          </p:blipFill>
-          <p:spPr>
-            <a:xfrm>
-              <a:off x="2138749" y="4133894"/>
-              <a:ext cx="3986772" cy="2990079"/>
-            </a:xfrm>
-            <a:prstGeom prst="rect">
-              <a:avLst/>
-            </a:prstGeom>
-          </p:spPr>
-        </p:pic>
-      </p:grpSp>
-      <p:grpSp>
-        <p:nvGrpSpPr>
-          <p:cNvPr id="13" name="Group 12"/>
-          <p:cNvGrpSpPr/>
+          <a:prstGeom prst="rect">
+            <a:avLst/>
+          </a:prstGeom>
+        </p:spPr>
+      </p:pic>
+      <p:pic>
+        <p:nvPicPr>
+          <p:cNvPr id="8" name="Picture 7"/>
+          <p:cNvPicPr>
+            <a:picLocks noChangeAspect="1"/>
+          </p:cNvPicPr>
           <p:nvPr/>
-        </p:nvGrpSpPr>
-        <p:grpSpPr>
+        </p:nvPicPr>
+        <p:blipFill>
+          <a:blip r:embed="rId3" cstate="print">
+            <a:extLst>
+              <a:ext uri="{28A0092B-C50C-407E-A947-70E740481C1C}">
+                <a14:useLocalDpi xmlns:a14="http://schemas.microsoft.com/office/drawing/2010/main" val="0"/>
+              </a:ext>
+            </a:extLst>
+          </a:blip>
+          <a:stretch>
+            <a:fillRect/>
+          </a:stretch>
+        </p:blipFill>
+        <p:spPr>
           <a:xfrm>
-            <a:off x="0" y="4571998"/>
-            <a:ext cx="9144000" cy="2286001"/>
-            <a:chOff x="-1848023" y="1143815"/>
-            <a:chExt cx="11960316" cy="2990080"/>
+            <a:off x="0" y="4572000"/>
+            <a:ext cx="3048000" cy="2285999"/>
           </a:xfrm>
-        </p:grpSpPr>
-        <p:pic>
-          <p:nvPicPr>
-            <p:cNvPr id="10" name="Picture 9"/>
-            <p:cNvPicPr>
-              <a:picLocks noChangeAspect="1"/>
-            </p:cNvPicPr>
-            <p:nvPr/>
-          </p:nvPicPr>
-          <p:blipFill>
-            <a:blip r:embed="rId5" cstate="print">
-              <a:extLst>
-                <a:ext uri="{28A0092B-C50C-407E-A947-70E740481C1C}">
-                  <a14:useLocalDpi xmlns:a14="http://schemas.microsoft.com/office/drawing/2010/main" val="0"/>
-                </a:ext>
-              </a:extLst>
-            </a:blip>
-            <a:stretch>
-              <a:fillRect/>
-            </a:stretch>
-          </p:blipFill>
-          <p:spPr>
-            <a:xfrm>
-              <a:off x="6125521" y="1143815"/>
-              <a:ext cx="3986772" cy="2990079"/>
-            </a:xfrm>
-            <a:prstGeom prst="rect">
-              <a:avLst/>
-            </a:prstGeom>
-          </p:spPr>
-        </p:pic>
-        <p:pic>
-          <p:nvPicPr>
-            <p:cNvPr id="11" name="Picture 10"/>
-            <p:cNvPicPr>
-              <a:picLocks noChangeAspect="1"/>
-            </p:cNvPicPr>
-            <p:nvPr/>
-          </p:nvPicPr>
-          <p:blipFill>
-            <a:blip r:embed="rId6" cstate="print">
-              <a:extLst>
-                <a:ext uri="{28A0092B-C50C-407E-A947-70E740481C1C}">
-                  <a14:useLocalDpi xmlns:a14="http://schemas.microsoft.com/office/drawing/2010/main" val="0"/>
-                </a:ext>
-              </a:extLst>
-            </a:blip>
-            <a:stretch>
-              <a:fillRect/>
-            </a:stretch>
-          </p:blipFill>
-          <p:spPr>
-            <a:xfrm>
-              <a:off x="-1848023" y="1143816"/>
-              <a:ext cx="3986772" cy="2990079"/>
-            </a:xfrm>
-            <a:prstGeom prst="rect">
-              <a:avLst/>
-            </a:prstGeom>
-          </p:spPr>
-        </p:pic>
-        <p:pic>
-          <p:nvPicPr>
-            <p:cNvPr id="12" name="Picture 11"/>
-            <p:cNvPicPr>
-              <a:picLocks noChangeAspect="1"/>
-            </p:cNvPicPr>
-            <p:nvPr/>
-          </p:nvPicPr>
-          <p:blipFill>
-            <a:blip r:embed="rId7" cstate="print">
-              <a:extLst>
-                <a:ext uri="{28A0092B-C50C-407E-A947-70E740481C1C}">
-                  <a14:useLocalDpi xmlns:a14="http://schemas.microsoft.com/office/drawing/2010/main" val="0"/>
-                </a:ext>
-              </a:extLst>
-            </a:blip>
-            <a:stretch>
-              <a:fillRect/>
-            </a:stretch>
-          </p:blipFill>
-          <p:spPr>
-            <a:xfrm>
-              <a:off x="2138749" y="1143816"/>
-              <a:ext cx="3986772" cy="2990079"/>
-            </a:xfrm>
-            <a:prstGeom prst="rect">
-              <a:avLst/>
-            </a:prstGeom>
-          </p:spPr>
-        </p:pic>
-      </p:grpSp>
+          <a:prstGeom prst="rect">
+            <a:avLst/>
+          </a:prstGeom>
+        </p:spPr>
+      </p:pic>
+      <p:pic>
+        <p:nvPicPr>
+          <p:cNvPr id="9" name="Picture 8"/>
+          <p:cNvPicPr>
+            <a:picLocks noChangeAspect="1"/>
+          </p:cNvPicPr>
+          <p:nvPr/>
+        </p:nvPicPr>
+        <p:blipFill>
+          <a:blip r:embed="rId4" cstate="print">
+            <a:extLst>
+              <a:ext uri="{28A0092B-C50C-407E-A947-70E740481C1C}">
+                <a14:useLocalDpi xmlns:a14="http://schemas.microsoft.com/office/drawing/2010/main" val="0"/>
+              </a:ext>
+            </a:extLst>
+          </a:blip>
+          <a:stretch>
+            <a:fillRect/>
+          </a:stretch>
+        </p:blipFill>
+        <p:spPr>
+          <a:xfrm>
+            <a:off x="3048000" y="4572000"/>
+            <a:ext cx="3048000" cy="2285999"/>
+          </a:xfrm>
+          <a:prstGeom prst="rect">
+            <a:avLst/>
+          </a:prstGeom>
+        </p:spPr>
+      </p:pic>
+      <p:pic>
+        <p:nvPicPr>
+          <p:cNvPr id="10" name="Picture 9"/>
+          <p:cNvPicPr>
+            <a:picLocks noChangeAspect="1"/>
+          </p:cNvPicPr>
+          <p:nvPr/>
+        </p:nvPicPr>
+        <p:blipFill>
+          <a:blip r:embed="rId5" cstate="print">
+            <a:extLst>
+              <a:ext uri="{28A0092B-C50C-407E-A947-70E740481C1C}">
+                <a14:useLocalDpi xmlns:a14="http://schemas.microsoft.com/office/drawing/2010/main" val="0"/>
+              </a:ext>
+            </a:extLst>
+          </a:blip>
+          <a:stretch>
+            <a:fillRect/>
+          </a:stretch>
+        </p:blipFill>
+        <p:spPr>
+          <a:xfrm>
+            <a:off x="6096000" y="2286003"/>
+            <a:ext cx="3048000" cy="2285999"/>
+          </a:xfrm>
+          <a:prstGeom prst="rect">
+            <a:avLst/>
+          </a:prstGeom>
+        </p:spPr>
+      </p:pic>
+      <p:pic>
+        <p:nvPicPr>
+          <p:cNvPr id="11" name="Picture 10"/>
+          <p:cNvPicPr>
+            <a:picLocks noChangeAspect="1"/>
+          </p:cNvPicPr>
+          <p:nvPr/>
+        </p:nvPicPr>
+        <p:blipFill>
+          <a:blip r:embed="rId6" cstate="print">
+            <a:extLst>
+              <a:ext uri="{28A0092B-C50C-407E-A947-70E740481C1C}">
+                <a14:useLocalDpi xmlns:a14="http://schemas.microsoft.com/office/drawing/2010/main" val="0"/>
+              </a:ext>
+            </a:extLst>
+          </a:blip>
+          <a:stretch>
+            <a:fillRect/>
+          </a:stretch>
+        </p:blipFill>
+        <p:spPr>
+          <a:xfrm>
+            <a:off x="0" y="2286004"/>
+            <a:ext cx="3048000" cy="2285999"/>
+          </a:xfrm>
+          <a:prstGeom prst="rect">
+            <a:avLst/>
+          </a:prstGeom>
+        </p:spPr>
+      </p:pic>
+      <p:pic>
+        <p:nvPicPr>
+          <p:cNvPr id="12" name="Picture 11"/>
+          <p:cNvPicPr>
+            <a:picLocks noChangeAspect="1"/>
+          </p:cNvPicPr>
+          <p:nvPr/>
+        </p:nvPicPr>
+        <p:blipFill>
+          <a:blip r:embed="rId7" cstate="print">
+            <a:extLst>
+              <a:ext uri="{28A0092B-C50C-407E-A947-70E740481C1C}">
+                <a14:useLocalDpi xmlns:a14="http://schemas.microsoft.com/office/drawing/2010/main" val="0"/>
+              </a:ext>
+            </a:extLst>
+          </a:blip>
+          <a:stretch>
+            <a:fillRect/>
+          </a:stretch>
+        </p:blipFill>
+        <p:spPr>
+          <a:xfrm>
+            <a:off x="3048000" y="2286004"/>
+            <a:ext cx="3048000" cy="2285999"/>
+          </a:xfrm>
+          <a:prstGeom prst="rect">
+            <a:avLst/>
+          </a:prstGeom>
+        </p:spPr>
+      </p:pic>
+      <p:sp>
+        <p:nvSpPr>
+          <p:cNvPr id="3" name="TextBox 2"/>
+          <p:cNvSpPr txBox="1"/>
+          <p:nvPr/>
+        </p:nvSpPr>
+        <p:spPr>
+          <a:xfrm>
+            <a:off x="629841" y="1441622"/>
+            <a:ext cx="7886700" cy="646331"/>
+          </a:xfrm>
+          <a:prstGeom prst="rect">
+            <a:avLst/>
+          </a:prstGeom>
+          <a:noFill/>
+        </p:spPr>
+        <p:txBody>
+          <a:bodyPr wrap="square" rtlCol="0">
+            <a:spAutoFit/>
+          </a:bodyPr>
+          <a:lstStyle/>
+          <a:p>
+            <a:pPr marL="285750" indent="-285750">
+              <a:buFont typeface="Arial" panose="020B0604020202020204" pitchFamily="34" charset="0"/>
+              <a:buChar char="•"/>
+            </a:pPr>
+            <a:r>
+              <a:rPr lang="en-US" dirty="0" smtClean="0"/>
+              <a:t>No clear linear relationship, weighted or unweighted</a:t>
+            </a:r>
+          </a:p>
+          <a:p>
+            <a:pPr marL="285750" indent="-285750">
+              <a:buFont typeface="Arial" panose="020B0604020202020204" pitchFamily="34" charset="0"/>
+              <a:buChar char="•"/>
+            </a:pPr>
+            <a:r>
+              <a:rPr lang="en-US" dirty="0" smtClean="0"/>
+              <a:t>No significant relationship with </a:t>
+            </a:r>
+            <a:r>
+              <a:rPr lang="en-US" dirty="0" err="1" smtClean="0"/>
+              <a:t>betweeness</a:t>
+            </a:r>
+            <a:r>
+              <a:rPr lang="en-US" dirty="0" smtClean="0"/>
+              <a:t> centrality either</a:t>
+            </a:r>
+            <a:endParaRPr lang="en-US" dirty="0"/>
+          </a:p>
+        </p:txBody>
+      </p:sp>
     </p:spTree>
     <p:extLst>
       <p:ext uri="{BB962C8B-B14F-4D97-AF65-F5344CB8AC3E}">
@@ -3978,6 +4477,1794 @@
       </p:par>
     </p:tnLst>
   </p:timing>
+</p:sld>
+</file>
+
+<file path=ppt/slides/slide7.xml><?xml version="1.0" encoding="utf-8"?>
+<p:sld xmlns:a="http://schemas.openxmlformats.org/drawingml/2006/main" xmlns:r="http://schemas.openxmlformats.org/officeDocument/2006/relationships" xmlns:p="http://schemas.openxmlformats.org/presentationml/2006/main">
+  <p:cSld>
+    <p:spTree>
+      <p:nvGrpSpPr>
+        <p:cNvPr id="1" name=""/>
+        <p:cNvGrpSpPr/>
+        <p:nvPr/>
+      </p:nvGrpSpPr>
+      <p:grpSpPr>
+        <a:xfrm>
+          <a:off x="0" y="0"/>
+          <a:ext cx="0" cy="0"/>
+          <a:chOff x="0" y="0"/>
+          <a:chExt cx="0" cy="0"/>
+        </a:xfrm>
+      </p:grpSpPr>
+      <p:sp>
+        <p:nvSpPr>
+          <p:cNvPr id="2" name="Title 1"/>
+          <p:cNvSpPr>
+            <a:spLocks noGrp="1"/>
+          </p:cNvSpPr>
+          <p:nvPr>
+            <p:ph type="title"/>
+          </p:nvPr>
+        </p:nvSpPr>
+        <p:spPr/>
+        <p:txBody>
+          <a:bodyPr>
+            <a:normAutofit/>
+          </a:bodyPr>
+          <a:lstStyle/>
+          <a:p>
+            <a:r>
+              <a:rPr lang="en-US" sz="4000" dirty="0" smtClean="0"/>
+              <a:t>Maybe HITS? (link analysis algorithm)</a:t>
+            </a:r>
+            <a:endParaRPr lang="en-US" sz="4000" dirty="0"/>
+          </a:p>
+        </p:txBody>
+      </p:sp>
+      <p:pic>
+        <p:nvPicPr>
+          <p:cNvPr id="7" name="Content Placeholder 6"/>
+          <p:cNvPicPr>
+            <a:picLocks noGrp="1" noChangeAspect="1"/>
+          </p:cNvPicPr>
+          <p:nvPr>
+            <p:ph sz="half" idx="2"/>
+          </p:nvPr>
+        </p:nvPicPr>
+        <p:blipFill>
+          <a:blip r:embed="rId2">
+            <a:extLst>
+              <a:ext uri="{28A0092B-C50C-407E-A947-70E740481C1C}">
+                <a14:useLocalDpi xmlns:a14="http://schemas.microsoft.com/office/drawing/2010/main" val="0"/>
+              </a:ext>
+            </a:extLst>
+          </a:blip>
+          <a:stretch>
+            <a:fillRect/>
+          </a:stretch>
+        </p:blipFill>
+        <p:spPr>
+          <a:xfrm>
+            <a:off x="630238" y="2896593"/>
+            <a:ext cx="3868737" cy="2901552"/>
+          </a:xfrm>
+        </p:spPr>
+      </p:pic>
+      <p:sp>
+        <p:nvSpPr>
+          <p:cNvPr id="5" name="Text Placeholder 4"/>
+          <p:cNvSpPr>
+            <a:spLocks noGrp="1"/>
+          </p:cNvSpPr>
+          <p:nvPr>
+            <p:ph type="body" sz="quarter" idx="3"/>
+          </p:nvPr>
+        </p:nvSpPr>
+        <p:spPr>
+          <a:xfrm>
+            <a:off x="629842" y="1427967"/>
+            <a:ext cx="7886700" cy="1468626"/>
+          </a:xfrm>
+        </p:spPr>
+        <p:txBody>
+          <a:bodyPr anchor="t">
+            <a:normAutofit fontScale="92500"/>
+          </a:bodyPr>
+          <a:lstStyle/>
+          <a:p>
+            <a:pPr marL="342900" indent="-342900">
+              <a:buFont typeface="Arial" panose="020B0604020202020204" pitchFamily="34" charset="0"/>
+              <a:buChar char="•"/>
+            </a:pPr>
+            <a:r>
+              <a:rPr lang="en-US" b="0" dirty="0" smtClean="0"/>
+              <a:t>Computes the “Authority” and “Hub” values </a:t>
+            </a:r>
+          </a:p>
+          <a:p>
+            <a:pPr marL="342900" indent="-342900">
+              <a:buFont typeface="Arial" panose="020B0604020202020204" pitchFamily="34" charset="0"/>
+              <a:buChar char="•"/>
+            </a:pPr>
+            <a:r>
+              <a:rPr lang="en-US" b="0" dirty="0" smtClean="0"/>
+              <a:t>Hubs know good Authorities, good Authorities know good hubs</a:t>
+            </a:r>
+          </a:p>
+          <a:p>
+            <a:pPr marL="342900" indent="-342900">
+              <a:buFont typeface="Arial" panose="020B0604020202020204" pitchFamily="34" charset="0"/>
+              <a:buChar char="•"/>
+            </a:pPr>
+            <a:r>
+              <a:rPr lang="en-US" b="0" dirty="0" smtClean="0"/>
+              <a:t>Based on adjacency matrix, so similar to weighted in/out degree</a:t>
+            </a:r>
+          </a:p>
+          <a:p>
+            <a:pPr marL="342900" indent="-342900">
+              <a:buFont typeface="Arial" panose="020B0604020202020204" pitchFamily="34" charset="0"/>
+              <a:buChar char="•"/>
+            </a:pPr>
+            <a:endParaRPr lang="en-US" b="0" dirty="0"/>
+          </a:p>
+        </p:txBody>
+      </p:sp>
+      <p:pic>
+        <p:nvPicPr>
+          <p:cNvPr id="8" name="Content Placeholder 7"/>
+          <p:cNvPicPr>
+            <a:picLocks noGrp="1" noChangeAspect="1"/>
+          </p:cNvPicPr>
+          <p:nvPr>
+            <p:ph sz="quarter" idx="4"/>
+          </p:nvPr>
+        </p:nvPicPr>
+        <p:blipFill>
+          <a:blip r:embed="rId3">
+            <a:extLst>
+              <a:ext uri="{28A0092B-C50C-407E-A947-70E740481C1C}">
+                <a14:useLocalDpi xmlns:a14="http://schemas.microsoft.com/office/drawing/2010/main" val="0"/>
+              </a:ext>
+            </a:extLst>
+          </a:blip>
+          <a:stretch>
+            <a:fillRect/>
+          </a:stretch>
+        </p:blipFill>
+        <p:spPr>
+          <a:xfrm>
+            <a:off x="4629150" y="2889449"/>
+            <a:ext cx="3887788" cy="2915840"/>
+          </a:xfrm>
+        </p:spPr>
+      </p:pic>
+    </p:spTree>
+    <p:extLst>
+      <p:ext uri="{BB962C8B-B14F-4D97-AF65-F5344CB8AC3E}">
+        <p14:creationId xmlns:p14="http://schemas.microsoft.com/office/powerpoint/2010/main" val="1315233890"/>
+      </p:ext>
+    </p:extLst>
+  </p:cSld>
+  <p:clrMapOvr>
+    <a:masterClrMapping/>
+  </p:clrMapOvr>
+</p:sld>
+</file>
+
+<file path=ppt/slides/slide8.xml><?xml version="1.0" encoding="utf-8"?>
+<p:sld xmlns:a="http://schemas.openxmlformats.org/drawingml/2006/main" xmlns:r="http://schemas.openxmlformats.org/officeDocument/2006/relationships" xmlns:p="http://schemas.openxmlformats.org/presentationml/2006/main">
+  <p:cSld>
+    <p:spTree>
+      <p:nvGrpSpPr>
+        <p:cNvPr id="1" name=""/>
+        <p:cNvGrpSpPr/>
+        <p:nvPr/>
+      </p:nvGrpSpPr>
+      <p:grpSpPr>
+        <a:xfrm>
+          <a:off x="0" y="0"/>
+          <a:ext cx="0" cy="0"/>
+          <a:chOff x="0" y="0"/>
+          <a:chExt cx="0" cy="0"/>
+        </a:xfrm>
+      </p:grpSpPr>
+      <p:sp>
+        <p:nvSpPr>
+          <p:cNvPr id="2" name="Title 1"/>
+          <p:cNvSpPr>
+            <a:spLocks noGrp="1"/>
+          </p:cNvSpPr>
+          <p:nvPr>
+            <p:ph type="title"/>
+          </p:nvPr>
+        </p:nvSpPr>
+        <p:spPr>
+          <a:xfrm>
+            <a:off x="623888" y="381980"/>
+            <a:ext cx="7886700" cy="1071039"/>
+          </a:xfrm>
+        </p:spPr>
+        <p:txBody>
+          <a:bodyPr/>
+          <a:lstStyle/>
+          <a:p>
+            <a:r>
+              <a:rPr lang="en-US" dirty="0" smtClean="0"/>
+              <a:t>Seniority isn’t Authority</a:t>
+            </a:r>
+            <a:endParaRPr lang="en-US" dirty="0"/>
+          </a:p>
+        </p:txBody>
+      </p:sp>
+      <p:sp>
+        <p:nvSpPr>
+          <p:cNvPr id="8" name="Text Placeholder 7"/>
+          <p:cNvSpPr>
+            <a:spLocks noGrp="1"/>
+          </p:cNvSpPr>
+          <p:nvPr>
+            <p:ph type="body" idx="1"/>
+          </p:nvPr>
+        </p:nvSpPr>
+        <p:spPr>
+          <a:xfrm>
+            <a:off x="623888" y="1453020"/>
+            <a:ext cx="3872956" cy="3532339"/>
+          </a:xfrm>
+        </p:spPr>
+        <p:txBody>
+          <a:bodyPr numCol="1">
+            <a:normAutofit/>
+          </a:bodyPr>
+          <a:lstStyle/>
+          <a:p>
+            <a:r>
+              <a:rPr lang="en-US" sz="2000" b="1" dirty="0" smtClean="0"/>
+              <a:t>Senate, Top 10 Authority (2007)</a:t>
+            </a:r>
+          </a:p>
+          <a:p>
+            <a:pPr>
+              <a:lnSpc>
+                <a:spcPct val="100000"/>
+              </a:lnSpc>
+              <a:spcBef>
+                <a:spcPts val="0"/>
+              </a:spcBef>
+            </a:pPr>
+            <a:r>
+              <a:rPr lang="en-US" sz="2000" dirty="0"/>
+              <a:t>Harry Reid</a:t>
+            </a:r>
+          </a:p>
+          <a:p>
+            <a:pPr>
+              <a:lnSpc>
+                <a:spcPct val="100000"/>
+              </a:lnSpc>
+              <a:spcBef>
+                <a:spcPts val="0"/>
+              </a:spcBef>
+            </a:pPr>
+            <a:r>
+              <a:rPr lang="en-US" sz="2000" dirty="0"/>
+              <a:t>Edward M. Kennedy</a:t>
+            </a:r>
+          </a:p>
+          <a:p>
+            <a:pPr>
+              <a:lnSpc>
+                <a:spcPct val="100000"/>
+              </a:lnSpc>
+              <a:spcBef>
+                <a:spcPts val="0"/>
+              </a:spcBef>
+            </a:pPr>
+            <a:r>
+              <a:rPr lang="en-US" sz="2000" dirty="0"/>
+              <a:t>Dianne Feinstein</a:t>
+            </a:r>
+          </a:p>
+          <a:p>
+            <a:pPr>
+              <a:lnSpc>
+                <a:spcPct val="100000"/>
+              </a:lnSpc>
+              <a:spcBef>
+                <a:spcPts val="0"/>
+              </a:spcBef>
+            </a:pPr>
+            <a:r>
+              <a:rPr lang="en-US" sz="2000" dirty="0"/>
+              <a:t>Richard Durbin</a:t>
+            </a:r>
+          </a:p>
+          <a:p>
+            <a:pPr>
+              <a:lnSpc>
+                <a:spcPct val="100000"/>
+              </a:lnSpc>
+              <a:spcBef>
+                <a:spcPts val="0"/>
+              </a:spcBef>
+            </a:pPr>
+            <a:r>
+              <a:rPr lang="en-US" sz="2000" dirty="0"/>
+              <a:t>Joseph R.  Jr. Biden</a:t>
+            </a:r>
+          </a:p>
+          <a:p>
+            <a:pPr>
+              <a:lnSpc>
+                <a:spcPct val="100000"/>
+              </a:lnSpc>
+              <a:spcBef>
+                <a:spcPts val="0"/>
+              </a:spcBef>
+            </a:pPr>
+            <a:r>
+              <a:rPr lang="en-US" sz="2000" dirty="0"/>
+              <a:t>Hillary Rodham Clinton</a:t>
+            </a:r>
+          </a:p>
+          <a:p>
+            <a:pPr>
+              <a:lnSpc>
+                <a:spcPct val="100000"/>
+              </a:lnSpc>
+              <a:spcBef>
+                <a:spcPts val="0"/>
+              </a:spcBef>
+            </a:pPr>
+            <a:r>
+              <a:rPr lang="en-US" sz="2000" dirty="0"/>
+              <a:t>Christopher J. Dodd</a:t>
+            </a:r>
+          </a:p>
+          <a:p>
+            <a:pPr>
+              <a:lnSpc>
+                <a:spcPct val="100000"/>
+              </a:lnSpc>
+              <a:spcBef>
+                <a:spcPts val="0"/>
+              </a:spcBef>
+            </a:pPr>
+            <a:r>
+              <a:rPr lang="en-US" sz="2000" dirty="0"/>
+              <a:t>Jeff Bingaman</a:t>
+            </a:r>
+          </a:p>
+          <a:p>
+            <a:pPr>
+              <a:lnSpc>
+                <a:spcPct val="100000"/>
+              </a:lnSpc>
+              <a:spcBef>
+                <a:spcPts val="0"/>
+              </a:spcBef>
+            </a:pPr>
+            <a:r>
+              <a:rPr lang="en-US" sz="2000" dirty="0"/>
+              <a:t>John F. Kerry</a:t>
+            </a:r>
+          </a:p>
+          <a:p>
+            <a:pPr>
+              <a:lnSpc>
+                <a:spcPct val="100000"/>
+              </a:lnSpc>
+              <a:spcBef>
+                <a:spcPts val="0"/>
+              </a:spcBef>
+            </a:pPr>
+            <a:r>
+              <a:rPr lang="en-US" sz="2000" dirty="0"/>
+              <a:t>Russell D. Feingold</a:t>
+            </a:r>
+            <a:endParaRPr lang="en-US" sz="2000" dirty="0" smtClean="0"/>
+          </a:p>
+          <a:p>
+            <a:endParaRPr lang="en-US" dirty="0"/>
+          </a:p>
+        </p:txBody>
+      </p:sp>
+      <p:sp>
+        <p:nvSpPr>
+          <p:cNvPr id="9" name="Text Placeholder 7"/>
+          <p:cNvSpPr txBox="1">
+            <a:spLocks/>
+          </p:cNvSpPr>
+          <p:nvPr/>
+        </p:nvSpPr>
+        <p:spPr>
+          <a:xfrm>
+            <a:off x="4695500" y="1453020"/>
+            <a:ext cx="3872956" cy="3532339"/>
+          </a:xfrm>
+          <a:prstGeom prst="rect">
+            <a:avLst/>
+          </a:prstGeom>
+        </p:spPr>
+        <p:txBody>
+          <a:bodyPr vert="horz" lIns="91440" tIns="45720" rIns="91440" bIns="45720" numCol="1" rtlCol="0">
+            <a:normAutofit/>
+          </a:bodyPr>
+          <a:lstStyle>
+            <a:lvl1pPr marL="0" indent="0" algn="l" defTabSz="914400" rtl="0" eaLnBrk="1" latinLnBrk="0" hangingPunct="1">
+              <a:lnSpc>
+                <a:spcPct val="90000"/>
+              </a:lnSpc>
+              <a:spcBef>
+                <a:spcPts val="1000"/>
+              </a:spcBef>
+              <a:buFont typeface="Arial" panose="020B0604020202020204" pitchFamily="34" charset="0"/>
+              <a:buNone/>
+              <a:defRPr sz="2400" kern="1200">
+                <a:solidFill>
+                  <a:schemeClr val="tx1"/>
+                </a:solidFill>
+                <a:latin typeface="+mn-lt"/>
+                <a:ea typeface="+mn-ea"/>
+                <a:cs typeface="+mn-cs"/>
+              </a:defRPr>
+            </a:lvl1pPr>
+            <a:lvl2pPr marL="457200" indent="0" algn="l" defTabSz="914400" rtl="0" eaLnBrk="1" latinLnBrk="0" hangingPunct="1">
+              <a:lnSpc>
+                <a:spcPct val="90000"/>
+              </a:lnSpc>
+              <a:spcBef>
+                <a:spcPts val="500"/>
+              </a:spcBef>
+              <a:buFont typeface="Arial" panose="020B0604020202020204" pitchFamily="34" charset="0"/>
+              <a:buNone/>
+              <a:defRPr sz="2000" kern="1200">
+                <a:solidFill>
+                  <a:schemeClr val="tx1">
+                    <a:tint val="75000"/>
+                  </a:schemeClr>
+                </a:solidFill>
+                <a:latin typeface="+mn-lt"/>
+                <a:ea typeface="+mn-ea"/>
+                <a:cs typeface="+mn-cs"/>
+              </a:defRPr>
+            </a:lvl2pPr>
+            <a:lvl3pPr marL="914400" indent="0" algn="l" defTabSz="914400" rtl="0" eaLnBrk="1" latinLnBrk="0" hangingPunct="1">
+              <a:lnSpc>
+                <a:spcPct val="90000"/>
+              </a:lnSpc>
+              <a:spcBef>
+                <a:spcPts val="500"/>
+              </a:spcBef>
+              <a:buFont typeface="Arial" panose="020B0604020202020204" pitchFamily="34" charset="0"/>
+              <a:buNone/>
+              <a:defRPr sz="1800" kern="1200">
+                <a:solidFill>
+                  <a:schemeClr val="tx1">
+                    <a:tint val="75000"/>
+                  </a:schemeClr>
+                </a:solidFill>
+                <a:latin typeface="+mn-lt"/>
+                <a:ea typeface="+mn-ea"/>
+                <a:cs typeface="+mn-cs"/>
+              </a:defRPr>
+            </a:lvl3pPr>
+            <a:lvl4pPr marL="1371600" indent="0" algn="l" defTabSz="914400" rtl="0" eaLnBrk="1" latinLnBrk="0" hangingPunct="1">
+              <a:lnSpc>
+                <a:spcPct val="90000"/>
+              </a:lnSpc>
+              <a:spcBef>
+                <a:spcPts val="500"/>
+              </a:spcBef>
+              <a:buFont typeface="Arial" panose="020B0604020202020204" pitchFamily="34" charset="0"/>
+              <a:buNone/>
+              <a:defRPr sz="1600" kern="1200">
+                <a:solidFill>
+                  <a:schemeClr val="tx1">
+                    <a:tint val="75000"/>
+                  </a:schemeClr>
+                </a:solidFill>
+                <a:latin typeface="+mn-lt"/>
+                <a:ea typeface="+mn-ea"/>
+                <a:cs typeface="+mn-cs"/>
+              </a:defRPr>
+            </a:lvl4pPr>
+            <a:lvl5pPr marL="1828800" indent="0" algn="l" defTabSz="914400" rtl="0" eaLnBrk="1" latinLnBrk="0" hangingPunct="1">
+              <a:lnSpc>
+                <a:spcPct val="90000"/>
+              </a:lnSpc>
+              <a:spcBef>
+                <a:spcPts val="500"/>
+              </a:spcBef>
+              <a:buFont typeface="Arial" panose="020B0604020202020204" pitchFamily="34" charset="0"/>
+              <a:buNone/>
+              <a:defRPr sz="1600" kern="1200">
+                <a:solidFill>
+                  <a:schemeClr val="tx1">
+                    <a:tint val="75000"/>
+                  </a:schemeClr>
+                </a:solidFill>
+                <a:latin typeface="+mn-lt"/>
+                <a:ea typeface="+mn-ea"/>
+                <a:cs typeface="+mn-cs"/>
+              </a:defRPr>
+            </a:lvl5pPr>
+            <a:lvl6pPr marL="2286000" indent="0" algn="l" defTabSz="914400" rtl="0" eaLnBrk="1" latinLnBrk="0" hangingPunct="1">
+              <a:lnSpc>
+                <a:spcPct val="90000"/>
+              </a:lnSpc>
+              <a:spcBef>
+                <a:spcPts val="500"/>
+              </a:spcBef>
+              <a:buFont typeface="Arial" panose="020B0604020202020204" pitchFamily="34" charset="0"/>
+              <a:buNone/>
+              <a:defRPr sz="1600" kern="1200">
+                <a:solidFill>
+                  <a:schemeClr val="tx1">
+                    <a:tint val="75000"/>
+                  </a:schemeClr>
+                </a:solidFill>
+                <a:latin typeface="+mn-lt"/>
+                <a:ea typeface="+mn-ea"/>
+                <a:cs typeface="+mn-cs"/>
+              </a:defRPr>
+            </a:lvl6pPr>
+            <a:lvl7pPr marL="2743200" indent="0" algn="l" defTabSz="914400" rtl="0" eaLnBrk="1" latinLnBrk="0" hangingPunct="1">
+              <a:lnSpc>
+                <a:spcPct val="90000"/>
+              </a:lnSpc>
+              <a:spcBef>
+                <a:spcPts val="500"/>
+              </a:spcBef>
+              <a:buFont typeface="Arial" panose="020B0604020202020204" pitchFamily="34" charset="0"/>
+              <a:buNone/>
+              <a:defRPr sz="1600" kern="1200">
+                <a:solidFill>
+                  <a:schemeClr val="tx1">
+                    <a:tint val="75000"/>
+                  </a:schemeClr>
+                </a:solidFill>
+                <a:latin typeface="+mn-lt"/>
+                <a:ea typeface="+mn-ea"/>
+                <a:cs typeface="+mn-cs"/>
+              </a:defRPr>
+            </a:lvl7pPr>
+            <a:lvl8pPr marL="3200400" indent="0" algn="l" defTabSz="914400" rtl="0" eaLnBrk="1" latinLnBrk="0" hangingPunct="1">
+              <a:lnSpc>
+                <a:spcPct val="90000"/>
+              </a:lnSpc>
+              <a:spcBef>
+                <a:spcPts val="500"/>
+              </a:spcBef>
+              <a:buFont typeface="Arial" panose="020B0604020202020204" pitchFamily="34" charset="0"/>
+              <a:buNone/>
+              <a:defRPr sz="1600" kern="1200">
+                <a:solidFill>
+                  <a:schemeClr val="tx1">
+                    <a:tint val="75000"/>
+                  </a:schemeClr>
+                </a:solidFill>
+                <a:latin typeface="+mn-lt"/>
+                <a:ea typeface="+mn-ea"/>
+                <a:cs typeface="+mn-cs"/>
+              </a:defRPr>
+            </a:lvl8pPr>
+            <a:lvl9pPr marL="3657600" indent="0" algn="l" defTabSz="914400" rtl="0" eaLnBrk="1" latinLnBrk="0" hangingPunct="1">
+              <a:lnSpc>
+                <a:spcPct val="90000"/>
+              </a:lnSpc>
+              <a:spcBef>
+                <a:spcPts val="500"/>
+              </a:spcBef>
+              <a:buFont typeface="Arial" panose="020B0604020202020204" pitchFamily="34" charset="0"/>
+              <a:buNone/>
+              <a:defRPr sz="1600" kern="1200">
+                <a:solidFill>
+                  <a:schemeClr val="tx1">
+                    <a:tint val="75000"/>
+                  </a:schemeClr>
+                </a:solidFill>
+                <a:latin typeface="+mn-lt"/>
+                <a:ea typeface="+mn-ea"/>
+                <a:cs typeface="+mn-cs"/>
+              </a:defRPr>
+            </a:lvl9pPr>
+          </a:lstStyle>
+          <a:p>
+            <a:r>
+              <a:rPr lang="en-US" sz="2000" b="1" dirty="0" smtClean="0"/>
+              <a:t>Senate, top 10 Hubs (2007)</a:t>
+            </a:r>
+            <a:endParaRPr lang="en-US" b="1" dirty="0" smtClean="0"/>
+          </a:p>
+          <a:p>
+            <a:pPr>
+              <a:lnSpc>
+                <a:spcPct val="100000"/>
+              </a:lnSpc>
+              <a:spcBef>
+                <a:spcPts val="0"/>
+              </a:spcBef>
+            </a:pPr>
+            <a:r>
+              <a:rPr lang="en-US" sz="2000" dirty="0"/>
+              <a:t>John F. Kerry</a:t>
+            </a:r>
+          </a:p>
+          <a:p>
+            <a:pPr>
+              <a:lnSpc>
+                <a:spcPct val="100000"/>
+              </a:lnSpc>
+              <a:spcBef>
+                <a:spcPts val="0"/>
+              </a:spcBef>
+            </a:pPr>
+            <a:r>
+              <a:rPr lang="en-US" sz="2000" dirty="0"/>
+              <a:t>Richard Durbin</a:t>
+            </a:r>
+          </a:p>
+          <a:p>
+            <a:pPr>
+              <a:lnSpc>
+                <a:spcPct val="100000"/>
+              </a:lnSpc>
+              <a:spcBef>
+                <a:spcPts val="0"/>
+              </a:spcBef>
+            </a:pPr>
+            <a:r>
+              <a:rPr lang="en-US" sz="2000" dirty="0"/>
+              <a:t>Barbara Boxer</a:t>
+            </a:r>
+          </a:p>
+          <a:p>
+            <a:pPr>
+              <a:lnSpc>
+                <a:spcPct val="100000"/>
+              </a:lnSpc>
+              <a:spcBef>
+                <a:spcPts val="0"/>
+              </a:spcBef>
+            </a:pPr>
+            <a:r>
+              <a:rPr lang="en-US" sz="2000" dirty="0"/>
+              <a:t>Hillary Rodham Clinton</a:t>
+            </a:r>
+          </a:p>
+          <a:p>
+            <a:pPr>
+              <a:lnSpc>
+                <a:spcPct val="100000"/>
+              </a:lnSpc>
+              <a:spcBef>
+                <a:spcPts val="0"/>
+              </a:spcBef>
+            </a:pPr>
+            <a:r>
+              <a:rPr lang="en-US" sz="2000" dirty="0"/>
+              <a:t>Robert Menendez</a:t>
+            </a:r>
+          </a:p>
+          <a:p>
+            <a:pPr>
+              <a:lnSpc>
+                <a:spcPct val="100000"/>
+              </a:lnSpc>
+              <a:spcBef>
+                <a:spcPts val="0"/>
+              </a:spcBef>
+            </a:pPr>
+            <a:r>
+              <a:rPr lang="en-US" sz="2000" dirty="0"/>
+              <a:t>Sherrod Brown</a:t>
+            </a:r>
+          </a:p>
+          <a:p>
+            <a:pPr>
+              <a:lnSpc>
+                <a:spcPct val="100000"/>
+              </a:lnSpc>
+              <a:spcBef>
+                <a:spcPts val="0"/>
+              </a:spcBef>
+            </a:pPr>
+            <a:r>
+              <a:rPr lang="en-US" sz="2000" dirty="0"/>
+              <a:t>Charles E. Schumer</a:t>
+            </a:r>
+          </a:p>
+          <a:p>
+            <a:pPr>
+              <a:lnSpc>
+                <a:spcPct val="100000"/>
+              </a:lnSpc>
+              <a:spcBef>
+                <a:spcPts val="0"/>
+              </a:spcBef>
+            </a:pPr>
+            <a:r>
+              <a:rPr lang="en-US" sz="2000" dirty="0"/>
+              <a:t>Barack Obama</a:t>
+            </a:r>
+          </a:p>
+          <a:p>
+            <a:pPr>
+              <a:lnSpc>
+                <a:spcPct val="100000"/>
+              </a:lnSpc>
+              <a:spcBef>
+                <a:spcPts val="0"/>
+              </a:spcBef>
+            </a:pPr>
+            <a:r>
+              <a:rPr lang="en-US" sz="2000" dirty="0"/>
+              <a:t>Olympia J. Snowe</a:t>
+            </a:r>
+          </a:p>
+          <a:p>
+            <a:pPr>
+              <a:lnSpc>
+                <a:spcPct val="100000"/>
+              </a:lnSpc>
+              <a:spcBef>
+                <a:spcPts val="0"/>
+              </a:spcBef>
+            </a:pPr>
+            <a:r>
+              <a:rPr lang="en-US" sz="2000" dirty="0"/>
+              <a:t>Joseph I. Lieberman</a:t>
+            </a:r>
+            <a:endParaRPr lang="en-US" sz="2800" dirty="0"/>
+          </a:p>
+        </p:txBody>
+      </p:sp>
+      <p:sp>
+        <p:nvSpPr>
+          <p:cNvPr id="10" name="Text Placeholder 7"/>
+          <p:cNvSpPr txBox="1">
+            <a:spLocks/>
+          </p:cNvSpPr>
+          <p:nvPr/>
+        </p:nvSpPr>
+        <p:spPr>
+          <a:xfrm>
+            <a:off x="623888" y="5091830"/>
+            <a:ext cx="7944568" cy="1622121"/>
+          </a:xfrm>
+          <a:prstGeom prst="rect">
+            <a:avLst/>
+          </a:prstGeom>
+        </p:spPr>
+        <p:txBody>
+          <a:bodyPr vert="horz" lIns="91440" tIns="45720" rIns="91440" bIns="45720" numCol="1" rtlCol="0">
+            <a:normAutofit/>
+          </a:bodyPr>
+          <a:lstStyle>
+            <a:lvl1pPr marL="0" indent="0" algn="l" defTabSz="914400" rtl="0" eaLnBrk="1" latinLnBrk="0" hangingPunct="1">
+              <a:lnSpc>
+                <a:spcPct val="90000"/>
+              </a:lnSpc>
+              <a:spcBef>
+                <a:spcPts val="1000"/>
+              </a:spcBef>
+              <a:buFont typeface="Arial" panose="020B0604020202020204" pitchFamily="34" charset="0"/>
+              <a:buNone/>
+              <a:defRPr sz="2400" kern="1200">
+                <a:solidFill>
+                  <a:schemeClr val="tx1"/>
+                </a:solidFill>
+                <a:latin typeface="+mn-lt"/>
+                <a:ea typeface="+mn-ea"/>
+                <a:cs typeface="+mn-cs"/>
+              </a:defRPr>
+            </a:lvl1pPr>
+            <a:lvl2pPr marL="457200" indent="0" algn="l" defTabSz="914400" rtl="0" eaLnBrk="1" latinLnBrk="0" hangingPunct="1">
+              <a:lnSpc>
+                <a:spcPct val="90000"/>
+              </a:lnSpc>
+              <a:spcBef>
+                <a:spcPts val="500"/>
+              </a:spcBef>
+              <a:buFont typeface="Arial" panose="020B0604020202020204" pitchFamily="34" charset="0"/>
+              <a:buNone/>
+              <a:defRPr sz="2000" kern="1200">
+                <a:solidFill>
+                  <a:schemeClr val="tx1">
+                    <a:tint val="75000"/>
+                  </a:schemeClr>
+                </a:solidFill>
+                <a:latin typeface="+mn-lt"/>
+                <a:ea typeface="+mn-ea"/>
+                <a:cs typeface="+mn-cs"/>
+              </a:defRPr>
+            </a:lvl2pPr>
+            <a:lvl3pPr marL="914400" indent="0" algn="l" defTabSz="914400" rtl="0" eaLnBrk="1" latinLnBrk="0" hangingPunct="1">
+              <a:lnSpc>
+                <a:spcPct val="90000"/>
+              </a:lnSpc>
+              <a:spcBef>
+                <a:spcPts val="500"/>
+              </a:spcBef>
+              <a:buFont typeface="Arial" panose="020B0604020202020204" pitchFamily="34" charset="0"/>
+              <a:buNone/>
+              <a:defRPr sz="1800" kern="1200">
+                <a:solidFill>
+                  <a:schemeClr val="tx1">
+                    <a:tint val="75000"/>
+                  </a:schemeClr>
+                </a:solidFill>
+                <a:latin typeface="+mn-lt"/>
+                <a:ea typeface="+mn-ea"/>
+                <a:cs typeface="+mn-cs"/>
+              </a:defRPr>
+            </a:lvl3pPr>
+            <a:lvl4pPr marL="1371600" indent="0" algn="l" defTabSz="914400" rtl="0" eaLnBrk="1" latinLnBrk="0" hangingPunct="1">
+              <a:lnSpc>
+                <a:spcPct val="90000"/>
+              </a:lnSpc>
+              <a:spcBef>
+                <a:spcPts val="500"/>
+              </a:spcBef>
+              <a:buFont typeface="Arial" panose="020B0604020202020204" pitchFamily="34" charset="0"/>
+              <a:buNone/>
+              <a:defRPr sz="1600" kern="1200">
+                <a:solidFill>
+                  <a:schemeClr val="tx1">
+                    <a:tint val="75000"/>
+                  </a:schemeClr>
+                </a:solidFill>
+                <a:latin typeface="+mn-lt"/>
+                <a:ea typeface="+mn-ea"/>
+                <a:cs typeface="+mn-cs"/>
+              </a:defRPr>
+            </a:lvl4pPr>
+            <a:lvl5pPr marL="1828800" indent="0" algn="l" defTabSz="914400" rtl="0" eaLnBrk="1" latinLnBrk="0" hangingPunct="1">
+              <a:lnSpc>
+                <a:spcPct val="90000"/>
+              </a:lnSpc>
+              <a:spcBef>
+                <a:spcPts val="500"/>
+              </a:spcBef>
+              <a:buFont typeface="Arial" panose="020B0604020202020204" pitchFamily="34" charset="0"/>
+              <a:buNone/>
+              <a:defRPr sz="1600" kern="1200">
+                <a:solidFill>
+                  <a:schemeClr val="tx1">
+                    <a:tint val="75000"/>
+                  </a:schemeClr>
+                </a:solidFill>
+                <a:latin typeface="+mn-lt"/>
+                <a:ea typeface="+mn-ea"/>
+                <a:cs typeface="+mn-cs"/>
+              </a:defRPr>
+            </a:lvl5pPr>
+            <a:lvl6pPr marL="2286000" indent="0" algn="l" defTabSz="914400" rtl="0" eaLnBrk="1" latinLnBrk="0" hangingPunct="1">
+              <a:lnSpc>
+                <a:spcPct val="90000"/>
+              </a:lnSpc>
+              <a:spcBef>
+                <a:spcPts val="500"/>
+              </a:spcBef>
+              <a:buFont typeface="Arial" panose="020B0604020202020204" pitchFamily="34" charset="0"/>
+              <a:buNone/>
+              <a:defRPr sz="1600" kern="1200">
+                <a:solidFill>
+                  <a:schemeClr val="tx1">
+                    <a:tint val="75000"/>
+                  </a:schemeClr>
+                </a:solidFill>
+                <a:latin typeface="+mn-lt"/>
+                <a:ea typeface="+mn-ea"/>
+                <a:cs typeface="+mn-cs"/>
+              </a:defRPr>
+            </a:lvl6pPr>
+            <a:lvl7pPr marL="2743200" indent="0" algn="l" defTabSz="914400" rtl="0" eaLnBrk="1" latinLnBrk="0" hangingPunct="1">
+              <a:lnSpc>
+                <a:spcPct val="90000"/>
+              </a:lnSpc>
+              <a:spcBef>
+                <a:spcPts val="500"/>
+              </a:spcBef>
+              <a:buFont typeface="Arial" panose="020B0604020202020204" pitchFamily="34" charset="0"/>
+              <a:buNone/>
+              <a:defRPr sz="1600" kern="1200">
+                <a:solidFill>
+                  <a:schemeClr val="tx1">
+                    <a:tint val="75000"/>
+                  </a:schemeClr>
+                </a:solidFill>
+                <a:latin typeface="+mn-lt"/>
+                <a:ea typeface="+mn-ea"/>
+                <a:cs typeface="+mn-cs"/>
+              </a:defRPr>
+            </a:lvl7pPr>
+            <a:lvl8pPr marL="3200400" indent="0" algn="l" defTabSz="914400" rtl="0" eaLnBrk="1" latinLnBrk="0" hangingPunct="1">
+              <a:lnSpc>
+                <a:spcPct val="90000"/>
+              </a:lnSpc>
+              <a:spcBef>
+                <a:spcPts val="500"/>
+              </a:spcBef>
+              <a:buFont typeface="Arial" panose="020B0604020202020204" pitchFamily="34" charset="0"/>
+              <a:buNone/>
+              <a:defRPr sz="1600" kern="1200">
+                <a:solidFill>
+                  <a:schemeClr val="tx1">
+                    <a:tint val="75000"/>
+                  </a:schemeClr>
+                </a:solidFill>
+                <a:latin typeface="+mn-lt"/>
+                <a:ea typeface="+mn-ea"/>
+                <a:cs typeface="+mn-cs"/>
+              </a:defRPr>
+            </a:lvl8pPr>
+            <a:lvl9pPr marL="3657600" indent="0" algn="l" defTabSz="914400" rtl="0" eaLnBrk="1" latinLnBrk="0" hangingPunct="1">
+              <a:lnSpc>
+                <a:spcPct val="90000"/>
+              </a:lnSpc>
+              <a:spcBef>
+                <a:spcPts val="500"/>
+              </a:spcBef>
+              <a:buFont typeface="Arial" panose="020B0604020202020204" pitchFamily="34" charset="0"/>
+              <a:buNone/>
+              <a:defRPr sz="1600" kern="1200">
+                <a:solidFill>
+                  <a:schemeClr val="tx1">
+                    <a:tint val="75000"/>
+                  </a:schemeClr>
+                </a:solidFill>
+                <a:latin typeface="+mn-lt"/>
+                <a:ea typeface="+mn-ea"/>
+                <a:cs typeface="+mn-cs"/>
+              </a:defRPr>
+            </a:lvl9pPr>
+          </a:lstStyle>
+          <a:p>
+            <a:pPr marL="457200" indent="-457200">
+              <a:buFont typeface="Arial" panose="020B0604020202020204" pitchFamily="34" charset="0"/>
+              <a:buChar char="•"/>
+            </a:pPr>
+            <a:r>
+              <a:rPr lang="en-US" sz="2800" dirty="0" smtClean="0"/>
+              <a:t>Accurately identifies important people in the Senate</a:t>
+            </a:r>
+          </a:p>
+        </p:txBody>
+      </p:sp>
+    </p:spTree>
+    <p:extLst>
+      <p:ext uri="{BB962C8B-B14F-4D97-AF65-F5344CB8AC3E}">
+        <p14:creationId xmlns:p14="http://schemas.microsoft.com/office/powerpoint/2010/main" val="3505286229"/>
+      </p:ext>
+    </p:extLst>
+  </p:cSld>
+  <p:clrMapOvr>
+    <a:masterClrMapping/>
+  </p:clrMapOvr>
+</p:sld>
+</file>
+
+<file path=ppt/slides/slide9.xml><?xml version="1.0" encoding="utf-8"?>
+<p:sld xmlns:a="http://schemas.openxmlformats.org/drawingml/2006/main" xmlns:r="http://schemas.openxmlformats.org/officeDocument/2006/relationships" xmlns:p="http://schemas.openxmlformats.org/presentationml/2006/main">
+  <p:cSld>
+    <p:spTree>
+      <p:nvGrpSpPr>
+        <p:cNvPr id="1" name=""/>
+        <p:cNvGrpSpPr/>
+        <p:nvPr/>
+      </p:nvGrpSpPr>
+      <p:grpSpPr>
+        <a:xfrm>
+          <a:off x="0" y="0"/>
+          <a:ext cx="0" cy="0"/>
+          <a:chOff x="0" y="0"/>
+          <a:chExt cx="0" cy="0"/>
+        </a:xfrm>
+      </p:grpSpPr>
+      <p:sp>
+        <p:nvSpPr>
+          <p:cNvPr id="2" name="Title 1"/>
+          <p:cNvSpPr>
+            <a:spLocks noGrp="1"/>
+          </p:cNvSpPr>
+          <p:nvPr>
+            <p:ph type="title"/>
+          </p:nvPr>
+        </p:nvSpPr>
+        <p:spPr>
+          <a:xfrm>
+            <a:off x="623888" y="381980"/>
+            <a:ext cx="7886700" cy="1071039"/>
+          </a:xfrm>
+        </p:spPr>
+        <p:txBody>
+          <a:bodyPr/>
+          <a:lstStyle/>
+          <a:p>
+            <a:r>
+              <a:rPr lang="en-US" dirty="0" smtClean="0"/>
+              <a:t>Didn’t work in the House</a:t>
+            </a:r>
+            <a:endParaRPr lang="en-US" dirty="0"/>
+          </a:p>
+        </p:txBody>
+      </p:sp>
+      <p:sp>
+        <p:nvSpPr>
+          <p:cNvPr id="8" name="Text Placeholder 7"/>
+          <p:cNvSpPr>
+            <a:spLocks noGrp="1"/>
+          </p:cNvSpPr>
+          <p:nvPr>
+            <p:ph type="body" idx="1"/>
+          </p:nvPr>
+        </p:nvSpPr>
+        <p:spPr>
+          <a:xfrm>
+            <a:off x="623888" y="1453020"/>
+            <a:ext cx="3872956" cy="3532339"/>
+          </a:xfrm>
+        </p:spPr>
+        <p:txBody>
+          <a:bodyPr numCol="1">
+            <a:normAutofit/>
+          </a:bodyPr>
+          <a:lstStyle/>
+          <a:p>
+            <a:r>
+              <a:rPr lang="en-US" sz="2000" b="1" dirty="0" smtClean="0"/>
+              <a:t>House, Top 10 Authority (2007)</a:t>
+            </a:r>
+          </a:p>
+          <a:p>
+            <a:pPr>
+              <a:lnSpc>
+                <a:spcPct val="100000"/>
+              </a:lnSpc>
+              <a:spcBef>
+                <a:spcPts val="0"/>
+              </a:spcBef>
+            </a:pPr>
+            <a:r>
+              <a:rPr lang="en-US" sz="2000" dirty="0"/>
+              <a:t>Barbara Lee</a:t>
+            </a:r>
+          </a:p>
+          <a:p>
+            <a:pPr>
+              <a:lnSpc>
+                <a:spcPct val="100000"/>
+              </a:lnSpc>
+              <a:spcBef>
+                <a:spcPts val="0"/>
+              </a:spcBef>
+            </a:pPr>
+            <a:r>
+              <a:rPr lang="en-US" sz="2000" dirty="0"/>
+              <a:t>Carolyn B. Maloney</a:t>
+            </a:r>
+          </a:p>
+          <a:p>
+            <a:pPr>
+              <a:lnSpc>
+                <a:spcPct val="100000"/>
+              </a:lnSpc>
+              <a:spcBef>
+                <a:spcPts val="0"/>
+              </a:spcBef>
+            </a:pPr>
+            <a:r>
+              <a:rPr lang="en-US" sz="2000" dirty="0"/>
+              <a:t>Rosa L. DeLauro</a:t>
+            </a:r>
+          </a:p>
+          <a:p>
+            <a:pPr>
+              <a:lnSpc>
+                <a:spcPct val="100000"/>
+              </a:lnSpc>
+              <a:spcBef>
+                <a:spcPts val="0"/>
+              </a:spcBef>
+            </a:pPr>
+            <a:r>
+              <a:rPr lang="en-US" sz="2000" dirty="0"/>
+              <a:t>John Lewis</a:t>
+            </a:r>
+          </a:p>
+          <a:p>
+            <a:pPr>
+              <a:lnSpc>
+                <a:spcPct val="100000"/>
+              </a:lnSpc>
+              <a:spcBef>
+                <a:spcPts val="0"/>
+              </a:spcBef>
+            </a:pPr>
+            <a:r>
+              <a:rPr lang="en-US" sz="2000" dirty="0"/>
+              <a:t>George Miller</a:t>
+            </a:r>
+          </a:p>
+          <a:p>
+            <a:pPr>
+              <a:lnSpc>
+                <a:spcPct val="100000"/>
+              </a:lnSpc>
+              <a:spcBef>
+                <a:spcPts val="0"/>
+              </a:spcBef>
+            </a:pPr>
+            <a:r>
+              <a:rPr lang="en-US" sz="2000" dirty="0"/>
+              <a:t>Eliot L. Engel</a:t>
+            </a:r>
+          </a:p>
+          <a:p>
+            <a:pPr>
+              <a:lnSpc>
+                <a:spcPct val="100000"/>
+              </a:lnSpc>
+              <a:spcBef>
+                <a:spcPts val="0"/>
+              </a:spcBef>
+            </a:pPr>
+            <a:r>
+              <a:rPr lang="en-US" sz="2000" dirty="0"/>
+              <a:t>Janice D. Schakowsky</a:t>
+            </a:r>
+          </a:p>
+          <a:p>
+            <a:pPr>
+              <a:lnSpc>
+                <a:spcPct val="100000"/>
+              </a:lnSpc>
+              <a:spcBef>
+                <a:spcPts val="0"/>
+              </a:spcBef>
+            </a:pPr>
+            <a:r>
+              <a:rPr lang="en-US" sz="2000" dirty="0"/>
+              <a:t>Lynn C. Woolsey</a:t>
+            </a:r>
+          </a:p>
+          <a:p>
+            <a:pPr>
+              <a:lnSpc>
+                <a:spcPct val="100000"/>
+              </a:lnSpc>
+              <a:spcBef>
+                <a:spcPts val="0"/>
+              </a:spcBef>
+            </a:pPr>
+            <a:r>
+              <a:rPr lang="en-US" sz="2000" dirty="0"/>
+              <a:t>Lois Capps</a:t>
+            </a:r>
+          </a:p>
+          <a:p>
+            <a:pPr>
+              <a:lnSpc>
+                <a:spcPct val="100000"/>
+              </a:lnSpc>
+              <a:spcBef>
+                <a:spcPts val="0"/>
+              </a:spcBef>
+            </a:pPr>
+            <a:r>
+              <a:rPr lang="en-US" sz="2000" dirty="0"/>
+              <a:t>Maxine Waters</a:t>
+            </a:r>
+            <a:endParaRPr lang="en-US" dirty="0"/>
+          </a:p>
+        </p:txBody>
+      </p:sp>
+      <p:sp>
+        <p:nvSpPr>
+          <p:cNvPr id="9" name="Text Placeholder 7"/>
+          <p:cNvSpPr txBox="1">
+            <a:spLocks/>
+          </p:cNvSpPr>
+          <p:nvPr/>
+        </p:nvSpPr>
+        <p:spPr>
+          <a:xfrm>
+            <a:off x="4695500" y="1453020"/>
+            <a:ext cx="3872956" cy="3532339"/>
+          </a:xfrm>
+          <a:prstGeom prst="rect">
+            <a:avLst/>
+          </a:prstGeom>
+        </p:spPr>
+        <p:txBody>
+          <a:bodyPr vert="horz" lIns="91440" tIns="45720" rIns="91440" bIns="45720" numCol="1" rtlCol="0">
+            <a:normAutofit/>
+          </a:bodyPr>
+          <a:lstStyle>
+            <a:lvl1pPr marL="0" indent="0" algn="l" defTabSz="914400" rtl="0" eaLnBrk="1" latinLnBrk="0" hangingPunct="1">
+              <a:lnSpc>
+                <a:spcPct val="90000"/>
+              </a:lnSpc>
+              <a:spcBef>
+                <a:spcPts val="1000"/>
+              </a:spcBef>
+              <a:buFont typeface="Arial" panose="020B0604020202020204" pitchFamily="34" charset="0"/>
+              <a:buNone/>
+              <a:defRPr sz="2400" kern="1200">
+                <a:solidFill>
+                  <a:schemeClr val="tx1"/>
+                </a:solidFill>
+                <a:latin typeface="+mn-lt"/>
+                <a:ea typeface="+mn-ea"/>
+                <a:cs typeface="+mn-cs"/>
+              </a:defRPr>
+            </a:lvl1pPr>
+            <a:lvl2pPr marL="457200" indent="0" algn="l" defTabSz="914400" rtl="0" eaLnBrk="1" latinLnBrk="0" hangingPunct="1">
+              <a:lnSpc>
+                <a:spcPct val="90000"/>
+              </a:lnSpc>
+              <a:spcBef>
+                <a:spcPts val="500"/>
+              </a:spcBef>
+              <a:buFont typeface="Arial" panose="020B0604020202020204" pitchFamily="34" charset="0"/>
+              <a:buNone/>
+              <a:defRPr sz="2000" kern="1200">
+                <a:solidFill>
+                  <a:schemeClr val="tx1">
+                    <a:tint val="75000"/>
+                  </a:schemeClr>
+                </a:solidFill>
+                <a:latin typeface="+mn-lt"/>
+                <a:ea typeface="+mn-ea"/>
+                <a:cs typeface="+mn-cs"/>
+              </a:defRPr>
+            </a:lvl2pPr>
+            <a:lvl3pPr marL="914400" indent="0" algn="l" defTabSz="914400" rtl="0" eaLnBrk="1" latinLnBrk="0" hangingPunct="1">
+              <a:lnSpc>
+                <a:spcPct val="90000"/>
+              </a:lnSpc>
+              <a:spcBef>
+                <a:spcPts val="500"/>
+              </a:spcBef>
+              <a:buFont typeface="Arial" panose="020B0604020202020204" pitchFamily="34" charset="0"/>
+              <a:buNone/>
+              <a:defRPr sz="1800" kern="1200">
+                <a:solidFill>
+                  <a:schemeClr val="tx1">
+                    <a:tint val="75000"/>
+                  </a:schemeClr>
+                </a:solidFill>
+                <a:latin typeface="+mn-lt"/>
+                <a:ea typeface="+mn-ea"/>
+                <a:cs typeface="+mn-cs"/>
+              </a:defRPr>
+            </a:lvl3pPr>
+            <a:lvl4pPr marL="1371600" indent="0" algn="l" defTabSz="914400" rtl="0" eaLnBrk="1" latinLnBrk="0" hangingPunct="1">
+              <a:lnSpc>
+                <a:spcPct val="90000"/>
+              </a:lnSpc>
+              <a:spcBef>
+                <a:spcPts val="500"/>
+              </a:spcBef>
+              <a:buFont typeface="Arial" panose="020B0604020202020204" pitchFamily="34" charset="0"/>
+              <a:buNone/>
+              <a:defRPr sz="1600" kern="1200">
+                <a:solidFill>
+                  <a:schemeClr val="tx1">
+                    <a:tint val="75000"/>
+                  </a:schemeClr>
+                </a:solidFill>
+                <a:latin typeface="+mn-lt"/>
+                <a:ea typeface="+mn-ea"/>
+                <a:cs typeface="+mn-cs"/>
+              </a:defRPr>
+            </a:lvl4pPr>
+            <a:lvl5pPr marL="1828800" indent="0" algn="l" defTabSz="914400" rtl="0" eaLnBrk="1" latinLnBrk="0" hangingPunct="1">
+              <a:lnSpc>
+                <a:spcPct val="90000"/>
+              </a:lnSpc>
+              <a:spcBef>
+                <a:spcPts val="500"/>
+              </a:spcBef>
+              <a:buFont typeface="Arial" panose="020B0604020202020204" pitchFamily="34" charset="0"/>
+              <a:buNone/>
+              <a:defRPr sz="1600" kern="1200">
+                <a:solidFill>
+                  <a:schemeClr val="tx1">
+                    <a:tint val="75000"/>
+                  </a:schemeClr>
+                </a:solidFill>
+                <a:latin typeface="+mn-lt"/>
+                <a:ea typeface="+mn-ea"/>
+                <a:cs typeface="+mn-cs"/>
+              </a:defRPr>
+            </a:lvl5pPr>
+            <a:lvl6pPr marL="2286000" indent="0" algn="l" defTabSz="914400" rtl="0" eaLnBrk="1" latinLnBrk="0" hangingPunct="1">
+              <a:lnSpc>
+                <a:spcPct val="90000"/>
+              </a:lnSpc>
+              <a:spcBef>
+                <a:spcPts val="500"/>
+              </a:spcBef>
+              <a:buFont typeface="Arial" panose="020B0604020202020204" pitchFamily="34" charset="0"/>
+              <a:buNone/>
+              <a:defRPr sz="1600" kern="1200">
+                <a:solidFill>
+                  <a:schemeClr val="tx1">
+                    <a:tint val="75000"/>
+                  </a:schemeClr>
+                </a:solidFill>
+                <a:latin typeface="+mn-lt"/>
+                <a:ea typeface="+mn-ea"/>
+                <a:cs typeface="+mn-cs"/>
+              </a:defRPr>
+            </a:lvl6pPr>
+            <a:lvl7pPr marL="2743200" indent="0" algn="l" defTabSz="914400" rtl="0" eaLnBrk="1" latinLnBrk="0" hangingPunct="1">
+              <a:lnSpc>
+                <a:spcPct val="90000"/>
+              </a:lnSpc>
+              <a:spcBef>
+                <a:spcPts val="500"/>
+              </a:spcBef>
+              <a:buFont typeface="Arial" panose="020B0604020202020204" pitchFamily="34" charset="0"/>
+              <a:buNone/>
+              <a:defRPr sz="1600" kern="1200">
+                <a:solidFill>
+                  <a:schemeClr val="tx1">
+                    <a:tint val="75000"/>
+                  </a:schemeClr>
+                </a:solidFill>
+                <a:latin typeface="+mn-lt"/>
+                <a:ea typeface="+mn-ea"/>
+                <a:cs typeface="+mn-cs"/>
+              </a:defRPr>
+            </a:lvl7pPr>
+            <a:lvl8pPr marL="3200400" indent="0" algn="l" defTabSz="914400" rtl="0" eaLnBrk="1" latinLnBrk="0" hangingPunct="1">
+              <a:lnSpc>
+                <a:spcPct val="90000"/>
+              </a:lnSpc>
+              <a:spcBef>
+                <a:spcPts val="500"/>
+              </a:spcBef>
+              <a:buFont typeface="Arial" panose="020B0604020202020204" pitchFamily="34" charset="0"/>
+              <a:buNone/>
+              <a:defRPr sz="1600" kern="1200">
+                <a:solidFill>
+                  <a:schemeClr val="tx1">
+                    <a:tint val="75000"/>
+                  </a:schemeClr>
+                </a:solidFill>
+                <a:latin typeface="+mn-lt"/>
+                <a:ea typeface="+mn-ea"/>
+                <a:cs typeface="+mn-cs"/>
+              </a:defRPr>
+            </a:lvl8pPr>
+            <a:lvl9pPr marL="3657600" indent="0" algn="l" defTabSz="914400" rtl="0" eaLnBrk="1" latinLnBrk="0" hangingPunct="1">
+              <a:lnSpc>
+                <a:spcPct val="90000"/>
+              </a:lnSpc>
+              <a:spcBef>
+                <a:spcPts val="500"/>
+              </a:spcBef>
+              <a:buFont typeface="Arial" panose="020B0604020202020204" pitchFamily="34" charset="0"/>
+              <a:buNone/>
+              <a:defRPr sz="1600" kern="1200">
+                <a:solidFill>
+                  <a:schemeClr val="tx1">
+                    <a:tint val="75000"/>
+                  </a:schemeClr>
+                </a:solidFill>
+                <a:latin typeface="+mn-lt"/>
+                <a:ea typeface="+mn-ea"/>
+                <a:cs typeface="+mn-cs"/>
+              </a:defRPr>
+            </a:lvl9pPr>
+          </a:lstStyle>
+          <a:p>
+            <a:r>
+              <a:rPr lang="en-US" sz="2000" b="1" dirty="0" smtClean="0"/>
+              <a:t>House, top 10 Hubs (2007)</a:t>
+            </a:r>
+            <a:endParaRPr lang="en-US" b="1" dirty="0" smtClean="0"/>
+          </a:p>
+          <a:p>
+            <a:pPr>
+              <a:lnSpc>
+                <a:spcPct val="100000"/>
+              </a:lnSpc>
+              <a:spcBef>
+                <a:spcPts val="0"/>
+              </a:spcBef>
+            </a:pPr>
+            <a:r>
+              <a:rPr lang="en-US" sz="2000" dirty="0"/>
+              <a:t>Raul M. </a:t>
+            </a:r>
+            <a:r>
+              <a:rPr lang="en-US" sz="2000" dirty="0" err="1"/>
+              <a:t>Grijalva</a:t>
+            </a:r>
+            <a:endParaRPr lang="en-US" sz="2000" dirty="0"/>
+          </a:p>
+          <a:p>
+            <a:pPr>
+              <a:lnSpc>
+                <a:spcPct val="100000"/>
+              </a:lnSpc>
+              <a:spcBef>
+                <a:spcPts val="0"/>
+              </a:spcBef>
+            </a:pPr>
+            <a:r>
+              <a:rPr lang="en-US" sz="2000" dirty="0"/>
+              <a:t>Janice D. Schakowsky</a:t>
+            </a:r>
+          </a:p>
+          <a:p>
+            <a:pPr>
+              <a:lnSpc>
+                <a:spcPct val="100000"/>
+              </a:lnSpc>
+              <a:spcBef>
+                <a:spcPts val="0"/>
+              </a:spcBef>
+            </a:pPr>
+            <a:r>
+              <a:rPr lang="en-US" sz="2000" dirty="0"/>
+              <a:t>Sheila Jackson-Lee</a:t>
+            </a:r>
+          </a:p>
+          <a:p>
+            <a:pPr>
+              <a:lnSpc>
+                <a:spcPct val="100000"/>
+              </a:lnSpc>
+              <a:spcBef>
+                <a:spcPts val="0"/>
+              </a:spcBef>
+            </a:pPr>
+            <a:r>
+              <a:rPr lang="en-US" sz="2000" dirty="0"/>
+              <a:t>Steve Cohen</a:t>
+            </a:r>
+          </a:p>
+          <a:p>
+            <a:pPr>
+              <a:lnSpc>
+                <a:spcPct val="100000"/>
+              </a:lnSpc>
+              <a:spcBef>
+                <a:spcPts val="0"/>
+              </a:spcBef>
+            </a:pPr>
+            <a:r>
+              <a:rPr lang="en-US" sz="2000" dirty="0"/>
+              <a:t>James P. McGovern</a:t>
+            </a:r>
+          </a:p>
+          <a:p>
+            <a:pPr>
+              <a:lnSpc>
+                <a:spcPct val="100000"/>
+              </a:lnSpc>
+              <a:spcBef>
+                <a:spcPts val="0"/>
+              </a:spcBef>
+            </a:pPr>
+            <a:r>
+              <a:rPr lang="en-US" sz="2000" dirty="0"/>
+              <a:t>Donald M. Payne</a:t>
+            </a:r>
+          </a:p>
+          <a:p>
+            <a:pPr>
+              <a:lnSpc>
+                <a:spcPct val="100000"/>
+              </a:lnSpc>
+              <a:spcBef>
+                <a:spcPts val="0"/>
+              </a:spcBef>
+            </a:pPr>
+            <a:r>
+              <a:rPr lang="en-US" sz="2000" dirty="0"/>
+              <a:t>Lynn C. Woolsey</a:t>
+            </a:r>
+          </a:p>
+          <a:p>
+            <a:pPr>
+              <a:lnSpc>
+                <a:spcPct val="100000"/>
+              </a:lnSpc>
+              <a:spcBef>
+                <a:spcPts val="0"/>
+              </a:spcBef>
+            </a:pPr>
+            <a:r>
+              <a:rPr lang="en-US" sz="2000" dirty="0"/>
+              <a:t>Maurice D. Hinchey</a:t>
+            </a:r>
+          </a:p>
+          <a:p>
+            <a:pPr>
+              <a:lnSpc>
+                <a:spcPct val="100000"/>
+              </a:lnSpc>
+              <a:spcBef>
+                <a:spcPts val="0"/>
+              </a:spcBef>
+            </a:pPr>
+            <a:r>
+              <a:rPr lang="en-US" sz="2000" dirty="0"/>
+              <a:t>Michael M. Honda</a:t>
+            </a:r>
+          </a:p>
+          <a:p>
+            <a:pPr>
+              <a:lnSpc>
+                <a:spcPct val="100000"/>
+              </a:lnSpc>
+              <a:spcBef>
+                <a:spcPts val="0"/>
+              </a:spcBef>
+            </a:pPr>
+            <a:r>
+              <a:rPr lang="en-US" sz="2000" dirty="0"/>
+              <a:t>Bob Filner</a:t>
+            </a:r>
+            <a:endParaRPr lang="en-US" sz="2800" dirty="0"/>
+          </a:p>
+        </p:txBody>
+      </p:sp>
+      <p:sp>
+        <p:nvSpPr>
+          <p:cNvPr id="10" name="Text Placeholder 7"/>
+          <p:cNvSpPr txBox="1">
+            <a:spLocks/>
+          </p:cNvSpPr>
+          <p:nvPr/>
+        </p:nvSpPr>
+        <p:spPr>
+          <a:xfrm>
+            <a:off x="623888" y="5091830"/>
+            <a:ext cx="7944568" cy="1622121"/>
+          </a:xfrm>
+          <a:prstGeom prst="rect">
+            <a:avLst/>
+          </a:prstGeom>
+        </p:spPr>
+        <p:txBody>
+          <a:bodyPr vert="horz" lIns="91440" tIns="45720" rIns="91440" bIns="45720" numCol="1" rtlCol="0">
+            <a:normAutofit/>
+          </a:bodyPr>
+          <a:lstStyle>
+            <a:lvl1pPr marL="0" indent="0" algn="l" defTabSz="914400" rtl="0" eaLnBrk="1" latinLnBrk="0" hangingPunct="1">
+              <a:lnSpc>
+                <a:spcPct val="90000"/>
+              </a:lnSpc>
+              <a:spcBef>
+                <a:spcPts val="1000"/>
+              </a:spcBef>
+              <a:buFont typeface="Arial" panose="020B0604020202020204" pitchFamily="34" charset="0"/>
+              <a:buNone/>
+              <a:defRPr sz="2400" kern="1200">
+                <a:solidFill>
+                  <a:schemeClr val="tx1"/>
+                </a:solidFill>
+                <a:latin typeface="+mn-lt"/>
+                <a:ea typeface="+mn-ea"/>
+                <a:cs typeface="+mn-cs"/>
+              </a:defRPr>
+            </a:lvl1pPr>
+            <a:lvl2pPr marL="457200" indent="0" algn="l" defTabSz="914400" rtl="0" eaLnBrk="1" latinLnBrk="0" hangingPunct="1">
+              <a:lnSpc>
+                <a:spcPct val="90000"/>
+              </a:lnSpc>
+              <a:spcBef>
+                <a:spcPts val="500"/>
+              </a:spcBef>
+              <a:buFont typeface="Arial" panose="020B0604020202020204" pitchFamily="34" charset="0"/>
+              <a:buNone/>
+              <a:defRPr sz="2000" kern="1200">
+                <a:solidFill>
+                  <a:schemeClr val="tx1">
+                    <a:tint val="75000"/>
+                  </a:schemeClr>
+                </a:solidFill>
+                <a:latin typeface="+mn-lt"/>
+                <a:ea typeface="+mn-ea"/>
+                <a:cs typeface="+mn-cs"/>
+              </a:defRPr>
+            </a:lvl2pPr>
+            <a:lvl3pPr marL="914400" indent="0" algn="l" defTabSz="914400" rtl="0" eaLnBrk="1" latinLnBrk="0" hangingPunct="1">
+              <a:lnSpc>
+                <a:spcPct val="90000"/>
+              </a:lnSpc>
+              <a:spcBef>
+                <a:spcPts val="500"/>
+              </a:spcBef>
+              <a:buFont typeface="Arial" panose="020B0604020202020204" pitchFamily="34" charset="0"/>
+              <a:buNone/>
+              <a:defRPr sz="1800" kern="1200">
+                <a:solidFill>
+                  <a:schemeClr val="tx1">
+                    <a:tint val="75000"/>
+                  </a:schemeClr>
+                </a:solidFill>
+                <a:latin typeface="+mn-lt"/>
+                <a:ea typeface="+mn-ea"/>
+                <a:cs typeface="+mn-cs"/>
+              </a:defRPr>
+            </a:lvl3pPr>
+            <a:lvl4pPr marL="1371600" indent="0" algn="l" defTabSz="914400" rtl="0" eaLnBrk="1" latinLnBrk="0" hangingPunct="1">
+              <a:lnSpc>
+                <a:spcPct val="90000"/>
+              </a:lnSpc>
+              <a:spcBef>
+                <a:spcPts val="500"/>
+              </a:spcBef>
+              <a:buFont typeface="Arial" panose="020B0604020202020204" pitchFamily="34" charset="0"/>
+              <a:buNone/>
+              <a:defRPr sz="1600" kern="1200">
+                <a:solidFill>
+                  <a:schemeClr val="tx1">
+                    <a:tint val="75000"/>
+                  </a:schemeClr>
+                </a:solidFill>
+                <a:latin typeface="+mn-lt"/>
+                <a:ea typeface="+mn-ea"/>
+                <a:cs typeface="+mn-cs"/>
+              </a:defRPr>
+            </a:lvl4pPr>
+            <a:lvl5pPr marL="1828800" indent="0" algn="l" defTabSz="914400" rtl="0" eaLnBrk="1" latinLnBrk="0" hangingPunct="1">
+              <a:lnSpc>
+                <a:spcPct val="90000"/>
+              </a:lnSpc>
+              <a:spcBef>
+                <a:spcPts val="500"/>
+              </a:spcBef>
+              <a:buFont typeface="Arial" panose="020B0604020202020204" pitchFamily="34" charset="0"/>
+              <a:buNone/>
+              <a:defRPr sz="1600" kern="1200">
+                <a:solidFill>
+                  <a:schemeClr val="tx1">
+                    <a:tint val="75000"/>
+                  </a:schemeClr>
+                </a:solidFill>
+                <a:latin typeface="+mn-lt"/>
+                <a:ea typeface="+mn-ea"/>
+                <a:cs typeface="+mn-cs"/>
+              </a:defRPr>
+            </a:lvl5pPr>
+            <a:lvl6pPr marL="2286000" indent="0" algn="l" defTabSz="914400" rtl="0" eaLnBrk="1" latinLnBrk="0" hangingPunct="1">
+              <a:lnSpc>
+                <a:spcPct val="90000"/>
+              </a:lnSpc>
+              <a:spcBef>
+                <a:spcPts val="500"/>
+              </a:spcBef>
+              <a:buFont typeface="Arial" panose="020B0604020202020204" pitchFamily="34" charset="0"/>
+              <a:buNone/>
+              <a:defRPr sz="1600" kern="1200">
+                <a:solidFill>
+                  <a:schemeClr val="tx1">
+                    <a:tint val="75000"/>
+                  </a:schemeClr>
+                </a:solidFill>
+                <a:latin typeface="+mn-lt"/>
+                <a:ea typeface="+mn-ea"/>
+                <a:cs typeface="+mn-cs"/>
+              </a:defRPr>
+            </a:lvl6pPr>
+            <a:lvl7pPr marL="2743200" indent="0" algn="l" defTabSz="914400" rtl="0" eaLnBrk="1" latinLnBrk="0" hangingPunct="1">
+              <a:lnSpc>
+                <a:spcPct val="90000"/>
+              </a:lnSpc>
+              <a:spcBef>
+                <a:spcPts val="500"/>
+              </a:spcBef>
+              <a:buFont typeface="Arial" panose="020B0604020202020204" pitchFamily="34" charset="0"/>
+              <a:buNone/>
+              <a:defRPr sz="1600" kern="1200">
+                <a:solidFill>
+                  <a:schemeClr val="tx1">
+                    <a:tint val="75000"/>
+                  </a:schemeClr>
+                </a:solidFill>
+                <a:latin typeface="+mn-lt"/>
+                <a:ea typeface="+mn-ea"/>
+                <a:cs typeface="+mn-cs"/>
+              </a:defRPr>
+            </a:lvl7pPr>
+            <a:lvl8pPr marL="3200400" indent="0" algn="l" defTabSz="914400" rtl="0" eaLnBrk="1" latinLnBrk="0" hangingPunct="1">
+              <a:lnSpc>
+                <a:spcPct val="90000"/>
+              </a:lnSpc>
+              <a:spcBef>
+                <a:spcPts val="500"/>
+              </a:spcBef>
+              <a:buFont typeface="Arial" panose="020B0604020202020204" pitchFamily="34" charset="0"/>
+              <a:buNone/>
+              <a:defRPr sz="1600" kern="1200">
+                <a:solidFill>
+                  <a:schemeClr val="tx1">
+                    <a:tint val="75000"/>
+                  </a:schemeClr>
+                </a:solidFill>
+                <a:latin typeface="+mn-lt"/>
+                <a:ea typeface="+mn-ea"/>
+                <a:cs typeface="+mn-cs"/>
+              </a:defRPr>
+            </a:lvl8pPr>
+            <a:lvl9pPr marL="3657600" indent="0" algn="l" defTabSz="914400" rtl="0" eaLnBrk="1" latinLnBrk="0" hangingPunct="1">
+              <a:lnSpc>
+                <a:spcPct val="90000"/>
+              </a:lnSpc>
+              <a:spcBef>
+                <a:spcPts val="500"/>
+              </a:spcBef>
+              <a:buFont typeface="Arial" panose="020B0604020202020204" pitchFamily="34" charset="0"/>
+              <a:buNone/>
+              <a:defRPr sz="1600" kern="1200">
+                <a:solidFill>
+                  <a:schemeClr val="tx1">
+                    <a:tint val="75000"/>
+                  </a:schemeClr>
+                </a:solidFill>
+                <a:latin typeface="+mn-lt"/>
+                <a:ea typeface="+mn-ea"/>
+                <a:cs typeface="+mn-cs"/>
+              </a:defRPr>
+            </a:lvl9pPr>
+          </a:lstStyle>
+          <a:p>
+            <a:pPr marL="457200" indent="-457200">
+              <a:buFont typeface="Arial" panose="020B0604020202020204" pitchFamily="34" charset="0"/>
+              <a:buChar char="•"/>
+            </a:pPr>
+            <a:r>
+              <a:rPr lang="en-US" sz="2800" dirty="0" smtClean="0"/>
+              <a:t>Did not identify the Speaker of the House or major committee chairs</a:t>
+            </a:r>
+          </a:p>
+          <a:p>
+            <a:pPr marL="457200" indent="-457200">
+              <a:buFont typeface="Arial" panose="020B0604020202020204" pitchFamily="34" charset="0"/>
+              <a:buChar char="•"/>
+            </a:pPr>
+            <a:r>
+              <a:rPr lang="en-US" sz="2800" dirty="0" smtClean="0"/>
+              <a:t>Speaker was </a:t>
+            </a:r>
+            <a:r>
+              <a:rPr lang="en-US" sz="2800" smtClean="0"/>
+              <a:t>121</a:t>
+            </a:r>
+            <a:r>
+              <a:rPr lang="en-US" sz="2800" baseline="30000" smtClean="0"/>
+              <a:t>st</a:t>
+            </a:r>
+            <a:r>
+              <a:rPr lang="en-US" sz="2800" smtClean="0"/>
+              <a:t> authority</a:t>
+            </a:r>
+            <a:endParaRPr lang="en-US" sz="2800" dirty="0" smtClean="0"/>
+          </a:p>
+        </p:txBody>
+      </p:sp>
+    </p:spTree>
+    <p:extLst>
+      <p:ext uri="{BB962C8B-B14F-4D97-AF65-F5344CB8AC3E}">
+        <p14:creationId xmlns:p14="http://schemas.microsoft.com/office/powerpoint/2010/main" val="258138252"/>
+      </p:ext>
+    </p:extLst>
+  </p:cSld>
+  <p:clrMapOvr>
+    <a:masterClrMapping/>
+  </p:clrMapOvr>
 </p:sld>
 </file>
 

</xml_diff>